<commit_message>
Added Practice notebook on PyTorch tensors to W3S1.
</commit_message>
<xml_diff>
--- a/W3/1. W3S1 final/W3S1.pptx
+++ b/W3/1. W3S1 final/W3S1.pptx
@@ -5,7 +5,7 @@
     <p:sldMasterId id="2147483648" r:id="rId1"/>
   </p:sldMasterIdLst>
   <p:notesMasterIdLst>
-    <p:notesMasterId r:id="rId46"/>
+    <p:notesMasterId r:id="rId47"/>
   </p:notesMasterIdLst>
   <p:sldIdLst>
     <p:sldId id="377" r:id="rId2"/>
@@ -52,6 +52,7 @@
     <p:sldId id="386" r:id="rId43"/>
     <p:sldId id="652" r:id="rId44"/>
     <p:sldId id="404" r:id="rId45"/>
+    <p:sldId id="786" r:id="rId46"/>
   </p:sldIdLst>
   <p:sldSz cx="12192000" cy="6858000"/>
   <p:notesSz cx="6858000" cy="9144000"/>
@@ -243,6 +244,7 @@
         <p14:section name="II.5. A bit of practice" id="{7E6DFD35-08C1-4CD1-A069-3CEB97555F1B}">
           <p14:sldIdLst>
             <p14:sldId id="404"/>
+            <p14:sldId id="786"/>
           </p14:sldIdLst>
         </p14:section>
       </p14:sectionLst>
@@ -4338,7 +4340,7 @@
   <pc:docChgLst>
     <pc:chgData name="Matthieu De Mari" userId="dfb708c9-d8dc-439f-9a3b-c772bf4a311c" providerId="ADAL" clId="{44ABFB41-BEA6-4DBA-BBB4-11FE1C0F0B9A}"/>
     <pc:docChg chg="custSel addSld delSld modSld sldOrd delSection modSection">
-      <pc:chgData name="Matthieu De Mari" userId="dfb708c9-d8dc-439f-9a3b-c772bf4a311c" providerId="ADAL" clId="{44ABFB41-BEA6-4DBA-BBB4-11FE1C0F0B9A}" dt="2023-06-16T07:18:49.946" v="49" actId="17846"/>
+      <pc:chgData name="Matthieu De Mari" userId="dfb708c9-d8dc-439f-9a3b-c772bf4a311c" providerId="ADAL" clId="{44ABFB41-BEA6-4DBA-BBB4-11FE1C0F0B9A}" dt="2023-06-22T05:13:36.642" v="588" actId="20577"/>
       <pc:docMkLst>
         <pc:docMk/>
       </pc:docMkLst>
@@ -4373,12 +4375,104 @@
           </ac:spMkLst>
         </pc:spChg>
       </pc:sldChg>
-      <pc:sldChg chg="ord">
-        <pc:chgData name="Matthieu De Mari" userId="dfb708c9-d8dc-439f-9a3b-c772bf4a311c" providerId="ADAL" clId="{44ABFB41-BEA6-4DBA-BBB4-11FE1C0F0B9A}" dt="2023-06-16T07:18:42.810" v="48"/>
+      <pc:sldChg chg="modSp mod">
+        <pc:chgData name="Matthieu De Mari" userId="dfb708c9-d8dc-439f-9a3b-c772bf4a311c" providerId="ADAL" clId="{44ABFB41-BEA6-4DBA-BBB4-11FE1C0F0B9A}" dt="2023-06-22T04:21:57.417" v="55" actId="113"/>
+        <pc:sldMkLst>
+          <pc:docMk/>
+          <pc:sldMk cId="3251402422" sldId="381"/>
+        </pc:sldMkLst>
+        <pc:spChg chg="mod">
+          <ac:chgData name="Matthieu De Mari" userId="dfb708c9-d8dc-439f-9a3b-c772bf4a311c" providerId="ADAL" clId="{44ABFB41-BEA6-4DBA-BBB4-11FE1C0F0B9A}" dt="2023-06-22T04:21:38.832" v="52" actId="115"/>
+          <ac:spMkLst>
+            <pc:docMk/>
+            <pc:sldMk cId="3251402422" sldId="381"/>
+            <ac:spMk id="3" creationId="{EB875A09-F649-0453-782D-77AD08503234}"/>
+          </ac:spMkLst>
+        </pc:spChg>
+        <pc:spChg chg="mod">
+          <ac:chgData name="Matthieu De Mari" userId="dfb708c9-d8dc-439f-9a3b-c772bf4a311c" providerId="ADAL" clId="{44ABFB41-BEA6-4DBA-BBB4-11FE1C0F0B9A}" dt="2023-06-22T04:21:57.417" v="55" actId="113"/>
+          <ac:spMkLst>
+            <pc:docMk/>
+            <pc:sldMk cId="3251402422" sldId="381"/>
+            <ac:spMk id="4" creationId="{953DB814-D545-5828-A2A0-FEEF73BDC2D8}"/>
+          </ac:spMkLst>
+        </pc:spChg>
+      </pc:sldChg>
+      <pc:sldChg chg="modSp mod">
+        <pc:chgData name="Matthieu De Mari" userId="dfb708c9-d8dc-439f-9a3b-c772bf4a311c" providerId="ADAL" clId="{44ABFB41-BEA6-4DBA-BBB4-11FE1C0F0B9A}" dt="2023-06-22T04:23:23.153" v="83" actId="20577"/>
+        <pc:sldMkLst>
+          <pc:docMk/>
+          <pc:sldMk cId="1420298135" sldId="384"/>
+        </pc:sldMkLst>
+        <pc:spChg chg="mod">
+          <ac:chgData name="Matthieu De Mari" userId="dfb708c9-d8dc-439f-9a3b-c772bf4a311c" providerId="ADAL" clId="{44ABFB41-BEA6-4DBA-BBB4-11FE1C0F0B9A}" dt="2023-06-22T04:23:23.153" v="83" actId="20577"/>
+          <ac:spMkLst>
+            <pc:docMk/>
+            <pc:sldMk cId="1420298135" sldId="384"/>
+            <ac:spMk id="5" creationId="{CBDF5152-8165-F342-BDF9-7CF1D911D8E8}"/>
+          </ac:spMkLst>
+        </pc:spChg>
+      </pc:sldChg>
+      <pc:sldChg chg="modSp mod">
+        <pc:chgData name="Matthieu De Mari" userId="dfb708c9-d8dc-439f-9a3b-c772bf4a311c" providerId="ADAL" clId="{44ABFB41-BEA6-4DBA-BBB4-11FE1C0F0B9A}" dt="2023-06-22T04:23:28.994" v="84" actId="5793"/>
+        <pc:sldMkLst>
+          <pc:docMk/>
+          <pc:sldMk cId="2560511070" sldId="385"/>
+        </pc:sldMkLst>
+        <pc:spChg chg="mod">
+          <ac:chgData name="Matthieu De Mari" userId="dfb708c9-d8dc-439f-9a3b-c772bf4a311c" providerId="ADAL" clId="{44ABFB41-BEA6-4DBA-BBB4-11FE1C0F0B9A}" dt="2023-06-22T04:23:28.994" v="84" actId="5793"/>
+          <ac:spMkLst>
+            <pc:docMk/>
+            <pc:sldMk cId="2560511070" sldId="385"/>
+            <ac:spMk id="3" creationId="{BA745D00-1AA4-E710-F652-A7E165C17CC6}"/>
+          </ac:spMkLst>
+        </pc:spChg>
+      </pc:sldChg>
+      <pc:sldChg chg="modSp mod">
+        <pc:chgData name="Matthieu De Mari" userId="dfb708c9-d8dc-439f-9a3b-c772bf4a311c" providerId="ADAL" clId="{44ABFB41-BEA6-4DBA-BBB4-11FE1C0F0B9A}" dt="2023-06-22T04:24:52.798" v="132" actId="1076"/>
+        <pc:sldMkLst>
+          <pc:docMk/>
+          <pc:sldMk cId="1116470923" sldId="386"/>
+        </pc:sldMkLst>
+        <pc:spChg chg="mod">
+          <ac:chgData name="Matthieu De Mari" userId="dfb708c9-d8dc-439f-9a3b-c772bf4a311c" providerId="ADAL" clId="{44ABFB41-BEA6-4DBA-BBB4-11FE1C0F0B9A}" dt="2023-06-22T04:24:46.137" v="130" actId="114"/>
+          <ac:spMkLst>
+            <pc:docMk/>
+            <pc:sldMk cId="1116470923" sldId="386"/>
+            <ac:spMk id="3" creationId="{44608F03-1D5E-5E62-5A70-1B8EB17DF397}"/>
+          </ac:spMkLst>
+        </pc:spChg>
+        <pc:picChg chg="mod">
+          <ac:chgData name="Matthieu De Mari" userId="dfb708c9-d8dc-439f-9a3b-c772bf4a311c" providerId="ADAL" clId="{44ABFB41-BEA6-4DBA-BBB4-11FE1C0F0B9A}" dt="2023-06-22T04:24:52.798" v="132" actId="1076"/>
+          <ac:picMkLst>
+            <pc:docMk/>
+            <pc:sldMk cId="1116470923" sldId="386"/>
+            <ac:picMk id="7" creationId="{ECC234CE-D676-ECD3-D2E7-52357BDE961D}"/>
+          </ac:picMkLst>
+        </pc:picChg>
+      </pc:sldChg>
+      <pc:sldChg chg="modSp mod ord">
+        <pc:chgData name="Matthieu De Mari" userId="dfb708c9-d8dc-439f-9a3b-c772bf4a311c" providerId="ADAL" clId="{44ABFB41-BEA6-4DBA-BBB4-11FE1C0F0B9A}" dt="2023-06-22T05:13:32.876" v="585" actId="20577"/>
         <pc:sldMkLst>
           <pc:docMk/>
           <pc:sldMk cId="3140288791" sldId="404"/>
         </pc:sldMkLst>
+        <pc:spChg chg="mod">
+          <ac:chgData name="Matthieu De Mari" userId="dfb708c9-d8dc-439f-9a3b-c772bf4a311c" providerId="ADAL" clId="{44ABFB41-BEA6-4DBA-BBB4-11FE1C0F0B9A}" dt="2023-06-22T05:13:32.876" v="585" actId="20577"/>
+          <ac:spMkLst>
+            <pc:docMk/>
+            <pc:sldMk cId="3140288791" sldId="404"/>
+            <ac:spMk id="2" creationId="{581B7E6E-252F-1AB6-6445-27D0020E0280}"/>
+          </ac:spMkLst>
+        </pc:spChg>
+        <pc:spChg chg="mod">
+          <ac:chgData name="Matthieu De Mari" userId="dfb708c9-d8dc-439f-9a3b-c772bf4a311c" providerId="ADAL" clId="{44ABFB41-BEA6-4DBA-BBB4-11FE1C0F0B9A}" dt="2023-06-22T05:13:23.696" v="577" actId="20577"/>
+          <ac:spMkLst>
+            <pc:docMk/>
+            <pc:sldMk cId="3140288791" sldId="404"/>
+            <ac:spMk id="3" creationId="{088657BF-BB53-D488-1F2B-77F25EDE3A56}"/>
+          </ac:spMkLst>
+        </pc:spChg>
       </pc:sldChg>
       <pc:sldChg chg="modSp mod">
         <pc:chgData name="Matthieu De Mari" userId="dfb708c9-d8dc-439f-9a3b-c772bf4a311c" providerId="ADAL" clId="{44ABFB41-BEA6-4DBA-BBB4-11FE1C0F0B9A}" dt="2023-06-16T07:11:42.352" v="44" actId="20577"/>
@@ -4411,13 +4505,13 @@
         </pc:spChg>
       </pc:sldChg>
       <pc:sldChg chg="modSp mod">
-        <pc:chgData name="Matthieu De Mari" userId="dfb708c9-d8dc-439f-9a3b-c772bf4a311c" providerId="ADAL" clId="{44ABFB41-BEA6-4DBA-BBB4-11FE1C0F0B9A}" dt="2023-06-16T07:12:22.808" v="46" actId="20577"/>
+        <pc:chgData name="Matthieu De Mari" userId="dfb708c9-d8dc-439f-9a3b-c772bf4a311c" providerId="ADAL" clId="{44ABFB41-BEA6-4DBA-BBB4-11FE1C0F0B9A}" dt="2023-06-22T04:22:32.150" v="69" actId="20577"/>
         <pc:sldMkLst>
           <pc:docMk/>
           <pc:sldMk cId="1513778887" sldId="424"/>
         </pc:sldMkLst>
         <pc:spChg chg="mod">
-          <ac:chgData name="Matthieu De Mari" userId="dfb708c9-d8dc-439f-9a3b-c772bf4a311c" providerId="ADAL" clId="{44ABFB41-BEA6-4DBA-BBB4-11FE1C0F0B9A}" dt="2023-06-16T07:12:22.808" v="46" actId="20577"/>
+          <ac:chgData name="Matthieu De Mari" userId="dfb708c9-d8dc-439f-9a3b-c772bf4a311c" providerId="ADAL" clId="{44ABFB41-BEA6-4DBA-BBB4-11FE1C0F0B9A}" dt="2023-06-22T04:22:32.150" v="69" actId="20577"/>
           <ac:spMkLst>
             <pc:docMk/>
             <pc:sldMk cId="1513778887" sldId="424"/>
@@ -4426,13 +4520,13 @@
         </pc:spChg>
       </pc:sldChg>
       <pc:sldChg chg="modSp mod">
-        <pc:chgData name="Matthieu De Mari" userId="dfb708c9-d8dc-439f-9a3b-c772bf4a311c" providerId="ADAL" clId="{44ABFB41-BEA6-4DBA-BBB4-11FE1C0F0B9A}" dt="2023-06-16T07:12:20.322" v="45" actId="20577"/>
+        <pc:chgData name="Matthieu De Mari" userId="dfb708c9-d8dc-439f-9a3b-c772bf4a311c" providerId="ADAL" clId="{44ABFB41-BEA6-4DBA-BBB4-11FE1C0F0B9A}" dt="2023-06-22T04:22:23.531" v="62" actId="20577"/>
         <pc:sldMkLst>
           <pc:docMk/>
           <pc:sldMk cId="548772636" sldId="425"/>
         </pc:sldMkLst>
         <pc:spChg chg="mod">
-          <ac:chgData name="Matthieu De Mari" userId="dfb708c9-d8dc-439f-9a3b-c772bf4a311c" providerId="ADAL" clId="{44ABFB41-BEA6-4DBA-BBB4-11FE1C0F0B9A}" dt="2023-06-16T07:12:20.322" v="45" actId="20577"/>
+          <ac:chgData name="Matthieu De Mari" userId="dfb708c9-d8dc-439f-9a3b-c772bf4a311c" providerId="ADAL" clId="{44ABFB41-BEA6-4DBA-BBB4-11FE1C0F0B9A}" dt="2023-06-22T04:22:23.531" v="62" actId="20577"/>
           <ac:spMkLst>
             <pc:docMk/>
             <pc:sldMk cId="548772636" sldId="425"/>
@@ -4440,6 +4534,21 @@
           </ac:spMkLst>
         </pc:spChg>
       </pc:sldChg>
+      <pc:sldChg chg="modSp mod">
+        <pc:chgData name="Matthieu De Mari" userId="dfb708c9-d8dc-439f-9a3b-c772bf4a311c" providerId="ADAL" clId="{44ABFB41-BEA6-4DBA-BBB4-11FE1C0F0B9A}" dt="2023-06-22T04:22:42.074" v="79" actId="20577"/>
+        <pc:sldMkLst>
+          <pc:docMk/>
+          <pc:sldMk cId="995336806" sldId="426"/>
+        </pc:sldMkLst>
+        <pc:spChg chg="mod">
+          <ac:chgData name="Matthieu De Mari" userId="dfb708c9-d8dc-439f-9a3b-c772bf4a311c" providerId="ADAL" clId="{44ABFB41-BEA6-4DBA-BBB4-11FE1C0F0B9A}" dt="2023-06-22T04:22:42.074" v="79" actId="20577"/>
+          <ac:spMkLst>
+            <pc:docMk/>
+            <pc:sldMk cId="995336806" sldId="426"/>
+            <ac:spMk id="3" creationId="{FA1F1CE6-06FF-6DD6-265C-39A26CC7DB57}"/>
+          </ac:spMkLst>
+        </pc:spChg>
+      </pc:sldChg>
       <pc:sldChg chg="del">
         <pc:chgData name="Matthieu De Mari" userId="dfb708c9-d8dc-439f-9a3b-c772bf4a311c" providerId="ADAL" clId="{44ABFB41-BEA6-4DBA-BBB4-11FE1C0F0B9A}" dt="2023-06-16T07:10:04.549" v="0" actId="47"/>
         <pc:sldMkLst>
@@ -4447,6 +4556,36 @@
           <pc:sldMk cId="1567954153" sldId="608"/>
         </pc:sldMkLst>
       </pc:sldChg>
+      <pc:sldChg chg="modSp mod">
+        <pc:chgData name="Matthieu De Mari" userId="dfb708c9-d8dc-439f-9a3b-c772bf4a311c" providerId="ADAL" clId="{44ABFB41-BEA6-4DBA-BBB4-11FE1C0F0B9A}" dt="2023-06-22T04:23:11.719" v="81" actId="20577"/>
+        <pc:sldMkLst>
+          <pc:docMk/>
+          <pc:sldMk cId="1146881653" sldId="649"/>
+        </pc:sldMkLst>
+        <pc:spChg chg="mod">
+          <ac:chgData name="Matthieu De Mari" userId="dfb708c9-d8dc-439f-9a3b-c772bf4a311c" providerId="ADAL" clId="{44ABFB41-BEA6-4DBA-BBB4-11FE1C0F0B9A}" dt="2023-06-22T04:23:11.719" v="81" actId="20577"/>
+          <ac:spMkLst>
+            <pc:docMk/>
+            <pc:sldMk cId="1146881653" sldId="649"/>
+            <ac:spMk id="3" creationId="{DC9D8363-826B-D189-78FB-CCD945BC5477}"/>
+          </ac:spMkLst>
+        </pc:spChg>
+      </pc:sldChg>
+      <pc:sldChg chg="modSp mod">
+        <pc:chgData name="Matthieu De Mari" userId="dfb708c9-d8dc-439f-9a3b-c772bf4a311c" providerId="ADAL" clId="{44ABFB41-BEA6-4DBA-BBB4-11FE1C0F0B9A}" dt="2023-06-22T04:23:47.334" v="92" actId="120"/>
+        <pc:sldMkLst>
+          <pc:docMk/>
+          <pc:sldMk cId="2710721176" sldId="651"/>
+        </pc:sldMkLst>
+        <pc:spChg chg="mod">
+          <ac:chgData name="Matthieu De Mari" userId="dfb708c9-d8dc-439f-9a3b-c772bf4a311c" providerId="ADAL" clId="{44ABFB41-BEA6-4DBA-BBB4-11FE1C0F0B9A}" dt="2023-06-22T04:23:47.334" v="92" actId="120"/>
+          <ac:spMkLst>
+            <pc:docMk/>
+            <pc:sldMk cId="2710721176" sldId="651"/>
+            <ac:spMk id="3" creationId="{B616E96C-A3A7-C270-6E1D-F90C9FE6BDDB}"/>
+          </ac:spMkLst>
+        </pc:spChg>
+      </pc:sldChg>
       <pc:sldChg chg="del">
         <pc:chgData name="Matthieu De Mari" userId="dfb708c9-d8dc-439f-9a3b-c772bf4a311c" providerId="ADAL" clId="{44ABFB41-BEA6-4DBA-BBB4-11FE1C0F0B9A}" dt="2023-06-16T07:10:04.549" v="0" actId="47"/>
         <pc:sldMkLst>
@@ -4496,6 +4635,21 @@
             <pc:docMk/>
             <pc:sldMk cId="557429466" sldId="785"/>
             <ac:spMk id="5" creationId="{E85979EA-F014-A9DE-13D1-EA9A2099FCA3}"/>
+          </ac:spMkLst>
+        </pc:spChg>
+      </pc:sldChg>
+      <pc:sldChg chg="modSp add mod">
+        <pc:chgData name="Matthieu De Mari" userId="dfb708c9-d8dc-439f-9a3b-c772bf4a311c" providerId="ADAL" clId="{44ABFB41-BEA6-4DBA-BBB4-11FE1C0F0B9A}" dt="2023-06-22T05:13:36.642" v="588" actId="20577"/>
+        <pc:sldMkLst>
+          <pc:docMk/>
+          <pc:sldMk cId="2509505199" sldId="786"/>
+        </pc:sldMkLst>
+        <pc:spChg chg="mod">
+          <ac:chgData name="Matthieu De Mari" userId="dfb708c9-d8dc-439f-9a3b-c772bf4a311c" providerId="ADAL" clId="{44ABFB41-BEA6-4DBA-BBB4-11FE1C0F0B9A}" dt="2023-06-22T05:13:36.642" v="588" actId="20577"/>
+          <ac:spMkLst>
+            <pc:docMk/>
+            <pc:sldMk cId="2509505199" sldId="786"/>
+            <ac:spMk id="2" creationId="{581B7E6E-252F-1AB6-6445-27D0020E0280}"/>
           </ac:spMkLst>
         </pc:spChg>
       </pc:sldChg>
@@ -4586,7 +4740,7 @@
           <a:p>
             <a:fld id="{61478373-EB31-4867-8CF0-FA31364748A5}" type="datetimeFigureOut">
               <a:rPr lang="en-GB" smtClean="0"/>
-              <a:t>16/06/2023</a:t>
+              <a:t>22/06/2023</a:t>
             </a:fld>
             <a:endParaRPr lang="en-GB"/>
           </a:p>
@@ -5003,7 +5157,7 @@
           <a:p>
             <a:fld id="{E85DF616-B21E-4EF6-A6A5-95E2FB3EB1A1}" type="datetimeFigureOut">
               <a:rPr lang="en-GB" smtClean="0"/>
-              <a:t>16/06/2023</a:t>
+              <a:t>22/06/2023</a:t>
             </a:fld>
             <a:endParaRPr lang="en-GB"/>
           </a:p>
@@ -5203,7 +5357,7 @@
           <a:p>
             <a:fld id="{E85DF616-B21E-4EF6-A6A5-95E2FB3EB1A1}" type="datetimeFigureOut">
               <a:rPr lang="en-GB" smtClean="0"/>
-              <a:t>16/06/2023</a:t>
+              <a:t>22/06/2023</a:t>
             </a:fld>
             <a:endParaRPr lang="en-GB"/>
           </a:p>
@@ -5413,7 +5567,7 @@
           <a:p>
             <a:fld id="{E85DF616-B21E-4EF6-A6A5-95E2FB3EB1A1}" type="datetimeFigureOut">
               <a:rPr lang="en-GB" smtClean="0"/>
-              <a:t>16/06/2023</a:t>
+              <a:t>22/06/2023</a:t>
             </a:fld>
             <a:endParaRPr lang="en-GB"/>
           </a:p>
@@ -5613,7 +5767,7 @@
           <a:p>
             <a:fld id="{E85DF616-B21E-4EF6-A6A5-95E2FB3EB1A1}" type="datetimeFigureOut">
               <a:rPr lang="en-GB" smtClean="0"/>
-              <a:t>16/06/2023</a:t>
+              <a:t>22/06/2023</a:t>
             </a:fld>
             <a:endParaRPr lang="en-GB"/>
           </a:p>
@@ -5889,7 +6043,7 @@
           <a:p>
             <a:fld id="{E85DF616-B21E-4EF6-A6A5-95E2FB3EB1A1}" type="datetimeFigureOut">
               <a:rPr lang="en-GB" smtClean="0"/>
-              <a:t>16/06/2023</a:t>
+              <a:t>22/06/2023</a:t>
             </a:fld>
             <a:endParaRPr lang="en-GB"/>
           </a:p>
@@ -6157,7 +6311,7 @@
           <a:p>
             <a:fld id="{E85DF616-B21E-4EF6-A6A5-95E2FB3EB1A1}" type="datetimeFigureOut">
               <a:rPr lang="en-GB" smtClean="0"/>
-              <a:t>16/06/2023</a:t>
+              <a:t>22/06/2023</a:t>
             </a:fld>
             <a:endParaRPr lang="en-GB"/>
           </a:p>
@@ -6572,7 +6726,7 @@
           <a:p>
             <a:fld id="{E85DF616-B21E-4EF6-A6A5-95E2FB3EB1A1}" type="datetimeFigureOut">
               <a:rPr lang="en-GB" smtClean="0"/>
-              <a:t>16/06/2023</a:t>
+              <a:t>22/06/2023</a:t>
             </a:fld>
             <a:endParaRPr lang="en-GB"/>
           </a:p>
@@ -6714,7 +6868,7 @@
           <a:p>
             <a:fld id="{E85DF616-B21E-4EF6-A6A5-95E2FB3EB1A1}" type="datetimeFigureOut">
               <a:rPr lang="en-GB" smtClean="0"/>
-              <a:t>16/06/2023</a:t>
+              <a:t>22/06/2023</a:t>
             </a:fld>
             <a:endParaRPr lang="en-GB"/>
           </a:p>
@@ -6827,7 +6981,7 @@
           <a:p>
             <a:fld id="{E85DF616-B21E-4EF6-A6A5-95E2FB3EB1A1}" type="datetimeFigureOut">
               <a:rPr lang="en-GB" smtClean="0"/>
-              <a:t>16/06/2023</a:t>
+              <a:t>22/06/2023</a:t>
             </a:fld>
             <a:endParaRPr lang="en-GB"/>
           </a:p>
@@ -7140,7 +7294,7 @@
           <a:p>
             <a:fld id="{E85DF616-B21E-4EF6-A6A5-95E2FB3EB1A1}" type="datetimeFigureOut">
               <a:rPr lang="en-GB" smtClean="0"/>
-              <a:t>16/06/2023</a:t>
+              <a:t>22/06/2023</a:t>
             </a:fld>
             <a:endParaRPr lang="en-GB"/>
           </a:p>
@@ -7429,7 +7583,7 @@
           <a:p>
             <a:fld id="{E85DF616-B21E-4EF6-A6A5-95E2FB3EB1A1}" type="datetimeFigureOut">
               <a:rPr lang="en-GB" smtClean="0"/>
-              <a:t>16/06/2023</a:t>
+              <a:t>22/06/2023</a:t>
             </a:fld>
             <a:endParaRPr lang="en-GB"/>
           </a:p>
@@ -7672,7 +7826,7 @@
           <a:p>
             <a:fld id="{E85DF616-B21E-4EF6-A6A5-95E2FB3EB1A1}" type="datetimeFigureOut">
               <a:rPr lang="en-GB" smtClean="0"/>
-              <a:t>16/06/2023</a:t>
+              <a:t>22/06/2023</a:t>
             </a:fld>
             <a:endParaRPr lang="en-GB"/>
           </a:p>
@@ -12515,7 +12669,15 @@
             </a:pPr>
             <a:r>
               <a:rPr lang="en-GB" dirty="0"/>
-              <a:t>Tensors, just like NumPy arrays, support broadcasting.</a:t>
+              <a:t>Tensors, just like NumPy arrays, support </a:t>
+            </a:r>
+            <a:r>
+              <a:rPr lang="en-GB" b="1" dirty="0"/>
+              <a:t>broadcasting</a:t>
+            </a:r>
+            <a:r>
+              <a:rPr lang="en-GB" dirty="0"/>
+              <a:t>.</a:t>
             </a:r>
           </a:p>
           <a:p>
@@ -12524,15 +12686,23 @@
             </a:pPr>
             <a:r>
               <a:rPr lang="en-GB" dirty="0"/>
-              <a:t>Two tensors are “</a:t>
-            </a:r>
-            <a:r>
-              <a:rPr lang="en-GB" dirty="0" err="1"/>
+              <a:t>Two tensors are </a:t>
+            </a:r>
+            <a:r>
+              <a:rPr lang="en-GB" b="1" dirty="0"/>
+              <a:t>“</a:t>
+            </a:r>
+            <a:r>
+              <a:rPr lang="en-GB" b="1" dirty="0" err="1"/>
               <a:t>broadcastable</a:t>
             </a:r>
             <a:r>
-              <a:rPr lang="en-GB" dirty="0"/>
-              <a:t>” if the following rules hold:</a:t>
+              <a:rPr lang="en-GB" b="1" dirty="0"/>
+              <a:t>” </a:t>
+            </a:r>
+            <a:r>
+              <a:rPr lang="en-GB" dirty="0"/>
+              <a:t>if the following rules hold:</a:t>
             </a:r>
           </a:p>
           <a:p>
@@ -12544,7 +12714,15 @@
           <a:p>
             <a:r>
               <a:rPr lang="en-GB" dirty="0"/>
-              <a:t>When iterating over the dimension sizes, starting at the trailing dimension, the dimension sizes must either be equal, one of them is 1, or one of them does not exist.</a:t>
+              <a:t>When iterating over the dimension sizes, </a:t>
+            </a:r>
+            <a:r>
+              <a:rPr lang="en-GB" u="sng" dirty="0"/>
+              <a:t>starting at the trailing dimension</a:t>
+            </a:r>
+            <a:r>
+              <a:rPr lang="en-GB" dirty="0"/>
+              <a:t>, the dimension sizes must either be equal, one of them is 1, or one of them does not exist.</a:t>
             </a:r>
           </a:p>
           <a:p>
@@ -12583,17 +12761,36 @@
           </a:bodyPr>
           <a:lstStyle/>
           <a:p>
-            <a:r>
-              <a:rPr lang="en-GB" dirty="0"/>
-              <a:t>If two tensors x, y are “</a:t>
-            </a:r>
-            <a:r>
-              <a:rPr lang="en-GB" dirty="0" err="1"/>
+            <a:pPr marL="0" indent="0">
+              <a:buNone/>
+            </a:pPr>
+            <a:r>
+              <a:rPr lang="en-GB" dirty="0"/>
+              <a:t>If two tensors x, y are </a:t>
+            </a:r>
+            <a:r>
+              <a:rPr lang="en-GB" b="1" dirty="0"/>
+              <a:t>“</a:t>
+            </a:r>
+            <a:r>
+              <a:rPr lang="en-GB" b="1" dirty="0" err="1"/>
               <a:t>broadcastable</a:t>
             </a:r>
             <a:r>
-              <a:rPr lang="en-GB" dirty="0"/>
-              <a:t>”, the resulting tensor size is calculated as follows:</a:t>
+              <a:rPr lang="en-GB" b="1" dirty="0"/>
+              <a:t>”</a:t>
+            </a:r>
+            <a:r>
+              <a:rPr lang="en-GB" dirty="0"/>
+              <a:t>,</a:t>
+            </a:r>
+            <a:r>
+              <a:rPr lang="en-GB" b="1" dirty="0"/>
+              <a:t> </a:t>
+            </a:r>
+            <a:r>
+              <a:rPr lang="en-GB" dirty="0"/>
+              <a:t>the resulting tensor size is calculated as follows:</a:t>
             </a:r>
           </a:p>
           <a:p>
@@ -13919,23 +14116,7 @@
             </a:r>
             <a:r>
               <a:rPr lang="en-GB" dirty="0"/>
-              <a:t> will force transfer to the </a:t>
-            </a:r>
-            <a:r>
-              <a:rPr lang="en-GB" dirty="0" err="1"/>
-              <a:t>cpu</a:t>
-            </a:r>
-            <a:r>
-              <a:rPr lang="en-GB" dirty="0"/>
-              <a:t> or </a:t>
-            </a:r>
-            <a:r>
-              <a:rPr lang="en-GB" dirty="0" err="1"/>
-              <a:t>cuda</a:t>
-            </a:r>
-            <a:r>
-              <a:rPr lang="en-GB" dirty="0"/>
-              <a:t> respectively. Note that it might fail if your machine is not CUDA compatible.</a:t>
+              <a:t> will force transfer to the CPU or CUDA respectively. Note that it might fail if your machine is not CUDA compatible.</a:t>
             </a:r>
           </a:p>
           <a:p>
@@ -14150,23 +14331,7 @@
             </a:r>
             <a:r>
               <a:rPr lang="en-GB" dirty="0"/>
-              <a:t> will force transfer to the </a:t>
-            </a:r>
-            <a:r>
-              <a:rPr lang="en-GB" dirty="0" err="1"/>
-              <a:t>cpu</a:t>
-            </a:r>
-            <a:r>
-              <a:rPr lang="en-GB" dirty="0"/>
-              <a:t> or </a:t>
-            </a:r>
-            <a:r>
-              <a:rPr lang="en-GB" dirty="0" err="1"/>
-              <a:t>cuda</a:t>
-            </a:r>
-            <a:r>
-              <a:rPr lang="en-GB" dirty="0"/>
-              <a:t> respectively. Note that it might fail if your machine is not CUDA compatible.</a:t>
+              <a:t> will force transfer to the CPU or CUDA respectively. Note that it might fail if your machine is not CUDA compatible.</a:t>
             </a:r>
           </a:p>
           <a:p>
@@ -14329,19 +14494,21 @@
           </a:bodyPr>
           <a:lstStyle/>
           <a:p>
+            <a:pPr marL="0" indent="0">
+              <a:buNone/>
+            </a:pPr>
             <a:r>
               <a:rPr lang="en-GB" b="1" dirty="0"/>
-              <a:t>Keep in mind: two tensors with different devices cannot be used in the same operation! (same logic as </a:t>
+              <a:t>Keep in mind: two tensors with different devices cannot be used in the same operation! (same logic as with the </a:t>
             </a:r>
             <a:r>
               <a:rPr lang="en-GB" b="1" dirty="0" err="1"/>
               <a:t>dtypes</a:t>
             </a:r>
             <a:r>
-              <a:rPr lang="en-GB" b="1"/>
+              <a:rPr lang="en-GB" b="1" dirty="0"/>
               <a:t>).</a:t>
             </a:r>
-            <a:endParaRPr lang="en-GB" b="1" dirty="0"/>
           </a:p>
           <a:p>
             <a:endParaRPr lang="en-SG" dirty="0"/>
@@ -15162,6 +15329,10 @@
               <a:t>retain_grad</a:t>
             </a:r>
             <a:r>
+              <a:rPr lang="en-GB" b="1" dirty="0"/>
+              <a:t>()</a:t>
+            </a:r>
+            <a:r>
               <a:rPr lang="en-GB" dirty="0"/>
               <a:t> to </a:t>
             </a:r>
@@ -15334,7 +15505,7 @@
             </a:r>
             <a:r>
               <a:rPr lang="en-GB" b="1" dirty="0"/>
-              <a:t> </a:t>
+              <a:t>() </a:t>
             </a:r>
             <a:r>
               <a:rPr lang="en-GB" dirty="0"/>
@@ -15454,6 +15625,9 @@
           <a:bodyPr/>
           <a:lstStyle/>
           <a:p>
+            <a:pPr marL="0" indent="0">
+              <a:buNone/>
+            </a:pPr>
             <a:r>
               <a:rPr lang="en-GB" dirty="0"/>
               <a:t>Similarly, we can rewrite the </a:t>
@@ -16011,12 +16185,12 @@
           <a:bodyPr/>
           <a:lstStyle/>
           <a:p>
-            <a:pPr marL="0" indent="0" algn="ctr">
+            <a:pPr marL="0" indent="0">
               <a:buNone/>
             </a:pPr>
             <a:r>
               <a:rPr lang="en-GB" dirty="0"/>
-              <a:t>Before using this Neural Network on our dataset, we need to convert them to </a:t>
+              <a:t>Before using this Neural Network on our dataset, we need to convert samples to </a:t>
             </a:r>
             <a:r>
               <a:rPr lang="en-GB" dirty="0" err="1"/>
@@ -16232,10 +16406,10 @@
           </a:p>
           <a:p>
             <a:r>
-              <a:rPr lang="en-GB" dirty="0"/>
-              <a:t>Obviously depends on your machine (could achieve even more).</a:t>
-            </a:r>
-            <a:endParaRPr lang="en-SG" dirty="0"/>
+              <a:rPr lang="en-GB" i="1" dirty="0"/>
+              <a:t>(Obviously depends on your machine, could be even more on some specific DL GPUs).</a:t>
+            </a:r>
+            <a:endParaRPr lang="en-SG" i="1" dirty="0"/>
           </a:p>
         </p:txBody>
       </p:sp>
@@ -16267,8 +16441,8 @@
         </p:blipFill>
         <p:spPr>
           <a:xfrm>
-            <a:off x="2463083" y="4413750"/>
-            <a:ext cx="7976573" cy="2444250"/>
+            <a:off x="2237939" y="4493560"/>
+            <a:ext cx="7716121" cy="2364440"/>
           </a:xfrm>
           <a:prstGeom prst="rect">
             <a:avLst/>
@@ -16416,11 +16590,7 @@
           <a:p>
             <a:r>
               <a:rPr lang="en-GB" dirty="0"/>
-              <a:t>A bit of practice for you to try </a:t>
-            </a:r>
-            <a:r>
-              <a:rPr lang="en-GB"/>
-              <a:t>at home</a:t>
+              <a:t>A bit of practice for you</a:t>
             </a:r>
             <a:endParaRPr lang="en-SG" dirty="0"/>
           </a:p>
@@ -16444,8 +16614,145 @@
         </p:nvSpPr>
         <p:spPr>
           <a:xfrm>
-            <a:off x="838200" y="1825624"/>
-            <a:ext cx="10515600" cy="5032375"/>
+            <a:off x="838199" y="1825624"/>
+            <a:ext cx="11068665" cy="5032375"/>
+          </a:xfrm>
+        </p:spPr>
+        <p:txBody>
+          <a:bodyPr>
+            <a:normAutofit/>
+          </a:bodyPr>
+          <a:lstStyle/>
+          <a:p>
+            <a:pPr marL="0" indent="0">
+              <a:buNone/>
+            </a:pPr>
+            <a:r>
+              <a:rPr lang="en-GB" dirty="0"/>
+              <a:t>In order to practice your </a:t>
+            </a:r>
+            <a:r>
+              <a:rPr lang="en-GB" dirty="0" err="1"/>
+              <a:t>PyTorch</a:t>
+            </a:r>
+            <a:r>
+              <a:rPr lang="en-GB" dirty="0"/>
+              <a:t> Tensor skills,</a:t>
+            </a:r>
+          </a:p>
+          <a:p>
+            <a:r>
+              <a:rPr lang="en-GB" dirty="0"/>
+              <a:t>Have a look at Notebook #3,</a:t>
+            </a:r>
+          </a:p>
+          <a:p>
+            <a:r>
+              <a:rPr lang="en-GB" dirty="0"/>
+              <a:t>It contains three functions (computing the mean of a 2D tensor column-wise, finding indices where the values a 2D tensor are greater than 5, concatenating two 2D tensors, etc.)</a:t>
+            </a:r>
+          </a:p>
+          <a:p>
+            <a:r>
+              <a:rPr lang="en-GB" dirty="0"/>
+              <a:t>Solutions are given in the Notebook 3 solution folder.</a:t>
+            </a:r>
+          </a:p>
+          <a:p>
+            <a:pPr marL="0" indent="0">
+              <a:buNone/>
+            </a:pPr>
+            <a:r>
+              <a:rPr lang="en-GB" dirty="0"/>
+              <a:t>Let us use the remaining time to practice.</a:t>
+            </a:r>
+            <a:endParaRPr lang="en-SG" dirty="0"/>
+          </a:p>
+        </p:txBody>
+      </p:sp>
+    </p:spTree>
+    <p:extLst>
+      <p:ext uri="{BB962C8B-B14F-4D97-AF65-F5344CB8AC3E}">
+        <p14:creationId xmlns:p14="http://schemas.microsoft.com/office/powerpoint/2010/main" val="3140288791"/>
+      </p:ext>
+    </p:extLst>
+  </p:cSld>
+  <p:clrMapOvr>
+    <a:masterClrMapping/>
+  </p:clrMapOvr>
+</p:sld>
+</file>
+
+<file path=ppt/slides/slide45.xml><?xml version="1.0" encoding="utf-8"?>
+<p:sld xmlns:a="http://schemas.openxmlformats.org/drawingml/2006/main" xmlns:r="http://schemas.openxmlformats.org/officeDocument/2006/relationships" xmlns:p="http://schemas.openxmlformats.org/presentationml/2006/main">
+  <p:cSld>
+    <p:spTree>
+      <p:nvGrpSpPr>
+        <p:cNvPr id="1" name=""/>
+        <p:cNvGrpSpPr/>
+        <p:nvPr/>
+      </p:nvGrpSpPr>
+      <p:grpSpPr>
+        <a:xfrm>
+          <a:off x="0" y="0"/>
+          <a:ext cx="0" cy="0"/>
+          <a:chOff x="0" y="0"/>
+          <a:chExt cx="0" cy="0"/>
+        </a:xfrm>
+      </p:grpSpPr>
+      <p:sp>
+        <p:nvSpPr>
+          <p:cNvPr id="2" name="Title 1">
+            <a:extLst>
+              <a:ext uri="{FF2B5EF4-FFF2-40B4-BE49-F238E27FC236}">
+                <a16:creationId xmlns:a16="http://schemas.microsoft.com/office/drawing/2014/main" id="{581B7E6E-252F-1AB6-6445-27D0020E0280}"/>
+              </a:ext>
+            </a:extLst>
+          </p:cNvPr>
+          <p:cNvSpPr>
+            <a:spLocks noGrp="1"/>
+          </p:cNvSpPr>
+          <p:nvPr>
+            <p:ph type="title"/>
+          </p:nvPr>
+        </p:nvSpPr>
+        <p:spPr/>
+        <p:txBody>
+          <a:bodyPr/>
+          <a:lstStyle/>
+          <a:p>
+            <a:r>
+              <a:rPr lang="en-GB" dirty="0"/>
+              <a:t>A bit of practice </a:t>
+            </a:r>
+            <a:r>
+              <a:rPr lang="en-GB"/>
+              <a:t>for you</a:t>
+            </a:r>
+            <a:endParaRPr lang="en-SG" dirty="0"/>
+          </a:p>
+        </p:txBody>
+      </p:sp>
+      <p:sp>
+        <p:nvSpPr>
+          <p:cNvPr id="3" name="Content Placeholder 2">
+            <a:extLst>
+              <a:ext uri="{FF2B5EF4-FFF2-40B4-BE49-F238E27FC236}">
+                <a16:creationId xmlns:a16="http://schemas.microsoft.com/office/drawing/2014/main" id="{088657BF-BB53-D488-1F2B-77F25EDE3A56}"/>
+              </a:ext>
+            </a:extLst>
+          </p:cNvPr>
+          <p:cNvSpPr>
+            <a:spLocks noGrp="1"/>
+          </p:cNvSpPr>
+          <p:nvPr>
+            <p:ph idx="1"/>
+          </p:nvPr>
+        </p:nvSpPr>
+        <p:spPr>
+          <a:xfrm>
+            <a:off x="838199" y="1825624"/>
+            <a:ext cx="11068665" cy="5032375"/>
           </a:xfrm>
         </p:spPr>
         <p:txBody>
@@ -16459,7 +16766,7 @@
             </a:pPr>
             <a:r>
               <a:rPr lang="en-GB" dirty="0"/>
-              <a:t>In order to practice your </a:t>
+              <a:t>In order to continue your practice your </a:t>
             </a:r>
             <a:r>
               <a:rPr lang="en-GB" dirty="0" err="1"/>
@@ -16504,7 +16811,7 @@
           <a:p>
             <a:r>
               <a:rPr lang="en-GB" dirty="0"/>
-              <a:t>Transposing a given 2D tensor,</a:t>
+              <a:t>Transposing a given 2D tensor, computing its determinant, eigenvalues/eigenvectors,</a:t>
             </a:r>
           </a:p>
           <a:p>
@@ -16535,7 +16842,7 @@
             </a:r>
             <a:r>
               <a:rPr lang="en-GB" dirty="0" err="1"/>
-              <a:t>numpy</a:t>
+              <a:t>Numpy</a:t>
             </a:r>
             <a:r>
               <a:rPr lang="en-GB" dirty="0"/>
@@ -16543,7 +16850,7 @@
             </a:r>
             <a:r>
               <a:rPr lang="en-GB" dirty="0" err="1"/>
-              <a:t>pytorch</a:t>
+              <a:t>PyTorch</a:t>
             </a:r>
             <a:r>
               <a:rPr lang="en-GB" dirty="0"/>
@@ -16565,7 +16872,7 @@
     </p:spTree>
     <p:extLst>
       <p:ext uri="{BB962C8B-B14F-4D97-AF65-F5344CB8AC3E}">
-        <p14:creationId xmlns:p14="http://schemas.microsoft.com/office/powerpoint/2010/main" val="3140288791"/>
+        <p14:creationId xmlns:p14="http://schemas.microsoft.com/office/powerpoint/2010/main" val="2509505199"/>
       </p:ext>
     </p:extLst>
   </p:cSld>

</xml_diff>

<commit_message>
Reworked Week 3 materials.
</commit_message>
<xml_diff>
--- a/W3/1. W3S1 final/W3S1.pptx
+++ b/W3/1. W3S1 final/W3S1.pptx
@@ -4340,7 +4340,7 @@
   <pc:docChgLst>
     <pc:chgData name="Matthieu De Mari" userId="dfb708c9-d8dc-439f-9a3b-c772bf4a311c" providerId="ADAL" clId="{44ABFB41-BEA6-4DBA-BBB4-11FE1C0F0B9A}"/>
     <pc:docChg chg="custSel addSld delSld modSld sldOrd delSection modSection">
-      <pc:chgData name="Matthieu De Mari" userId="dfb708c9-d8dc-439f-9a3b-c772bf4a311c" providerId="ADAL" clId="{44ABFB41-BEA6-4DBA-BBB4-11FE1C0F0B9A}" dt="2023-06-22T05:13:36.642" v="588" actId="20577"/>
+      <pc:chgData name="Matthieu De Mari" userId="dfb708c9-d8dc-439f-9a3b-c772bf4a311c" providerId="ADAL" clId="{44ABFB41-BEA6-4DBA-BBB4-11FE1C0F0B9A}" dt="2023-07-06T02:56:04.856" v="671" actId="20577"/>
       <pc:docMkLst>
         <pc:docMk/>
       </pc:docMkLst>
@@ -4399,6 +4399,21 @@
         </pc:spChg>
       </pc:sldChg>
       <pc:sldChg chg="modSp mod">
+        <pc:chgData name="Matthieu De Mari" userId="dfb708c9-d8dc-439f-9a3b-c772bf4a311c" providerId="ADAL" clId="{44ABFB41-BEA6-4DBA-BBB4-11FE1C0F0B9A}" dt="2023-07-06T02:53:13.881" v="653" actId="113"/>
+        <pc:sldMkLst>
+          <pc:docMk/>
+          <pc:sldMk cId="1921397945" sldId="383"/>
+        </pc:sldMkLst>
+        <pc:spChg chg="mod">
+          <ac:chgData name="Matthieu De Mari" userId="dfb708c9-d8dc-439f-9a3b-c772bf4a311c" providerId="ADAL" clId="{44ABFB41-BEA6-4DBA-BBB4-11FE1C0F0B9A}" dt="2023-07-06T02:53:13.881" v="653" actId="113"/>
+          <ac:spMkLst>
+            <pc:docMk/>
+            <pc:sldMk cId="1921397945" sldId="383"/>
+            <ac:spMk id="3" creationId="{4E3EB5A2-1EBE-6555-85E5-4CA6DEF3845D}"/>
+          </ac:spMkLst>
+        </pc:spChg>
+      </pc:sldChg>
+      <pc:sldChg chg="modSp mod">
         <pc:chgData name="Matthieu De Mari" userId="dfb708c9-d8dc-439f-9a3b-c772bf4a311c" providerId="ADAL" clId="{44ABFB41-BEA6-4DBA-BBB4-11FE1C0F0B9A}" dt="2023-06-22T04:23:23.153" v="83" actId="20577"/>
         <pc:sldMkLst>
           <pc:docMk/>
@@ -4505,13 +4520,28 @@
         </pc:spChg>
       </pc:sldChg>
       <pc:sldChg chg="modSp mod">
-        <pc:chgData name="Matthieu De Mari" userId="dfb708c9-d8dc-439f-9a3b-c772bf4a311c" providerId="ADAL" clId="{44ABFB41-BEA6-4DBA-BBB4-11FE1C0F0B9A}" dt="2023-06-22T04:22:32.150" v="69" actId="20577"/>
+        <pc:chgData name="Matthieu De Mari" userId="dfb708c9-d8dc-439f-9a3b-c772bf4a311c" providerId="ADAL" clId="{44ABFB41-BEA6-4DBA-BBB4-11FE1C0F0B9A}" dt="2023-07-06T02:51:45.547" v="600" actId="20577"/>
+        <pc:sldMkLst>
+          <pc:docMk/>
+          <pc:sldMk cId="4145254973" sldId="423"/>
+        </pc:sldMkLst>
+        <pc:spChg chg="mod">
+          <ac:chgData name="Matthieu De Mari" userId="dfb708c9-d8dc-439f-9a3b-c772bf4a311c" providerId="ADAL" clId="{44ABFB41-BEA6-4DBA-BBB4-11FE1C0F0B9A}" dt="2023-07-06T02:51:45.547" v="600" actId="20577"/>
+          <ac:spMkLst>
+            <pc:docMk/>
+            <pc:sldMk cId="4145254973" sldId="423"/>
+            <ac:spMk id="3" creationId="{FA1F1CE6-06FF-6DD6-265C-39A26CC7DB57}"/>
+          </ac:spMkLst>
+        </pc:spChg>
+      </pc:sldChg>
+      <pc:sldChg chg="modSp mod">
+        <pc:chgData name="Matthieu De Mari" userId="dfb708c9-d8dc-439f-9a3b-c772bf4a311c" providerId="ADAL" clId="{44ABFB41-BEA6-4DBA-BBB4-11FE1C0F0B9A}" dt="2023-07-06T02:51:27.282" v="592" actId="20577"/>
         <pc:sldMkLst>
           <pc:docMk/>
           <pc:sldMk cId="1513778887" sldId="424"/>
         </pc:sldMkLst>
         <pc:spChg chg="mod">
-          <ac:chgData name="Matthieu De Mari" userId="dfb708c9-d8dc-439f-9a3b-c772bf4a311c" providerId="ADAL" clId="{44ABFB41-BEA6-4DBA-BBB4-11FE1C0F0B9A}" dt="2023-06-22T04:22:32.150" v="69" actId="20577"/>
+          <ac:chgData name="Matthieu De Mari" userId="dfb708c9-d8dc-439f-9a3b-c772bf4a311c" providerId="ADAL" clId="{44ABFB41-BEA6-4DBA-BBB4-11FE1C0F0B9A}" dt="2023-07-06T02:51:27.282" v="592" actId="20577"/>
           <ac:spMkLst>
             <pc:docMk/>
             <pc:sldMk cId="1513778887" sldId="424"/>
@@ -4520,13 +4550,13 @@
         </pc:spChg>
       </pc:sldChg>
       <pc:sldChg chg="modSp mod">
-        <pc:chgData name="Matthieu De Mari" userId="dfb708c9-d8dc-439f-9a3b-c772bf4a311c" providerId="ADAL" clId="{44ABFB41-BEA6-4DBA-BBB4-11FE1C0F0B9A}" dt="2023-06-22T04:22:23.531" v="62" actId="20577"/>
+        <pc:chgData name="Matthieu De Mari" userId="dfb708c9-d8dc-439f-9a3b-c772bf4a311c" providerId="ADAL" clId="{44ABFB41-BEA6-4DBA-BBB4-11FE1C0F0B9A}" dt="2023-07-06T02:51:39.838" v="596" actId="20577"/>
         <pc:sldMkLst>
           <pc:docMk/>
           <pc:sldMk cId="548772636" sldId="425"/>
         </pc:sldMkLst>
         <pc:spChg chg="mod">
-          <ac:chgData name="Matthieu De Mari" userId="dfb708c9-d8dc-439f-9a3b-c772bf4a311c" providerId="ADAL" clId="{44ABFB41-BEA6-4DBA-BBB4-11FE1C0F0B9A}" dt="2023-06-22T04:22:23.531" v="62" actId="20577"/>
+          <ac:chgData name="Matthieu De Mari" userId="dfb708c9-d8dc-439f-9a3b-c772bf4a311c" providerId="ADAL" clId="{44ABFB41-BEA6-4DBA-BBB4-11FE1C0F0B9A}" dt="2023-07-06T02:51:39.838" v="596" actId="20577"/>
           <ac:spMkLst>
             <pc:docMk/>
             <pc:sldMk cId="548772636" sldId="425"/>
@@ -4535,13 +4565,13 @@
         </pc:spChg>
       </pc:sldChg>
       <pc:sldChg chg="modSp mod">
-        <pc:chgData name="Matthieu De Mari" userId="dfb708c9-d8dc-439f-9a3b-c772bf4a311c" providerId="ADAL" clId="{44ABFB41-BEA6-4DBA-BBB4-11FE1C0F0B9A}" dt="2023-06-22T04:22:42.074" v="79" actId="20577"/>
+        <pc:chgData name="Matthieu De Mari" userId="dfb708c9-d8dc-439f-9a3b-c772bf4a311c" providerId="ADAL" clId="{44ABFB41-BEA6-4DBA-BBB4-11FE1C0F0B9A}" dt="2023-07-06T02:52:04.084" v="618" actId="20577"/>
         <pc:sldMkLst>
           <pc:docMk/>
           <pc:sldMk cId="995336806" sldId="426"/>
         </pc:sldMkLst>
         <pc:spChg chg="mod">
-          <ac:chgData name="Matthieu De Mari" userId="dfb708c9-d8dc-439f-9a3b-c772bf4a311c" providerId="ADAL" clId="{44ABFB41-BEA6-4DBA-BBB4-11FE1C0F0B9A}" dt="2023-06-22T04:22:42.074" v="79" actId="20577"/>
+          <ac:chgData name="Matthieu De Mari" userId="dfb708c9-d8dc-439f-9a3b-c772bf4a311c" providerId="ADAL" clId="{44ABFB41-BEA6-4DBA-BBB4-11FE1C0F0B9A}" dt="2023-07-06T02:52:04.084" v="618" actId="20577"/>
           <ac:spMkLst>
             <pc:docMk/>
             <pc:sldMk cId="995336806" sldId="426"/>
@@ -4639,7 +4669,7 @@
         </pc:spChg>
       </pc:sldChg>
       <pc:sldChg chg="modSp add mod">
-        <pc:chgData name="Matthieu De Mari" userId="dfb708c9-d8dc-439f-9a3b-c772bf4a311c" providerId="ADAL" clId="{44ABFB41-BEA6-4DBA-BBB4-11FE1C0F0B9A}" dt="2023-06-22T05:13:36.642" v="588" actId="20577"/>
+        <pc:chgData name="Matthieu De Mari" userId="dfb708c9-d8dc-439f-9a3b-c772bf4a311c" providerId="ADAL" clId="{44ABFB41-BEA6-4DBA-BBB4-11FE1C0F0B9A}" dt="2023-07-06T02:56:04.856" v="671" actId="20577"/>
         <pc:sldMkLst>
           <pc:docMk/>
           <pc:sldMk cId="2509505199" sldId="786"/>
@@ -4650,6 +4680,14 @@
             <pc:docMk/>
             <pc:sldMk cId="2509505199" sldId="786"/>
             <ac:spMk id="2" creationId="{581B7E6E-252F-1AB6-6445-27D0020E0280}"/>
+          </ac:spMkLst>
+        </pc:spChg>
+        <pc:spChg chg="mod">
+          <ac:chgData name="Matthieu De Mari" userId="dfb708c9-d8dc-439f-9a3b-c772bf4a311c" providerId="ADAL" clId="{44ABFB41-BEA6-4DBA-BBB4-11FE1C0F0B9A}" dt="2023-07-06T02:56:04.856" v="671" actId="20577"/>
+          <ac:spMkLst>
+            <pc:docMk/>
+            <pc:sldMk cId="2509505199" sldId="786"/>
+            <ac:spMk id="3" creationId="{088657BF-BB53-D488-1F2B-77F25EDE3A56}"/>
           </ac:spMkLst>
         </pc:spChg>
       </pc:sldChg>
@@ -4740,7 +4778,7 @@
           <a:p>
             <a:fld id="{61478373-EB31-4867-8CF0-FA31364748A5}" type="datetimeFigureOut">
               <a:rPr lang="en-GB" smtClean="0"/>
-              <a:t>22/06/2023</a:t>
+              <a:t>06/07/2023</a:t>
             </a:fld>
             <a:endParaRPr lang="en-GB"/>
           </a:p>
@@ -5157,7 +5195,7 @@
           <a:p>
             <a:fld id="{E85DF616-B21E-4EF6-A6A5-95E2FB3EB1A1}" type="datetimeFigureOut">
               <a:rPr lang="en-GB" smtClean="0"/>
-              <a:t>22/06/2023</a:t>
+              <a:t>06/07/2023</a:t>
             </a:fld>
             <a:endParaRPr lang="en-GB"/>
           </a:p>
@@ -5357,7 +5395,7 @@
           <a:p>
             <a:fld id="{E85DF616-B21E-4EF6-A6A5-95E2FB3EB1A1}" type="datetimeFigureOut">
               <a:rPr lang="en-GB" smtClean="0"/>
-              <a:t>22/06/2023</a:t>
+              <a:t>06/07/2023</a:t>
             </a:fld>
             <a:endParaRPr lang="en-GB"/>
           </a:p>
@@ -5567,7 +5605,7 @@
           <a:p>
             <a:fld id="{E85DF616-B21E-4EF6-A6A5-95E2FB3EB1A1}" type="datetimeFigureOut">
               <a:rPr lang="en-GB" smtClean="0"/>
-              <a:t>22/06/2023</a:t>
+              <a:t>06/07/2023</a:t>
             </a:fld>
             <a:endParaRPr lang="en-GB"/>
           </a:p>
@@ -5767,7 +5805,7 @@
           <a:p>
             <a:fld id="{E85DF616-B21E-4EF6-A6A5-95E2FB3EB1A1}" type="datetimeFigureOut">
               <a:rPr lang="en-GB" smtClean="0"/>
-              <a:t>22/06/2023</a:t>
+              <a:t>06/07/2023</a:t>
             </a:fld>
             <a:endParaRPr lang="en-GB"/>
           </a:p>
@@ -6043,7 +6081,7 @@
           <a:p>
             <a:fld id="{E85DF616-B21E-4EF6-A6A5-95E2FB3EB1A1}" type="datetimeFigureOut">
               <a:rPr lang="en-GB" smtClean="0"/>
-              <a:t>22/06/2023</a:t>
+              <a:t>06/07/2023</a:t>
             </a:fld>
             <a:endParaRPr lang="en-GB"/>
           </a:p>
@@ -6311,7 +6349,7 @@
           <a:p>
             <a:fld id="{E85DF616-B21E-4EF6-A6A5-95E2FB3EB1A1}" type="datetimeFigureOut">
               <a:rPr lang="en-GB" smtClean="0"/>
-              <a:t>22/06/2023</a:t>
+              <a:t>06/07/2023</a:t>
             </a:fld>
             <a:endParaRPr lang="en-GB"/>
           </a:p>
@@ -6726,7 +6764,7 @@
           <a:p>
             <a:fld id="{E85DF616-B21E-4EF6-A6A5-95E2FB3EB1A1}" type="datetimeFigureOut">
               <a:rPr lang="en-GB" smtClean="0"/>
-              <a:t>22/06/2023</a:t>
+              <a:t>06/07/2023</a:t>
             </a:fld>
             <a:endParaRPr lang="en-GB"/>
           </a:p>
@@ -6868,7 +6906,7 @@
           <a:p>
             <a:fld id="{E85DF616-B21E-4EF6-A6A5-95E2FB3EB1A1}" type="datetimeFigureOut">
               <a:rPr lang="en-GB" smtClean="0"/>
-              <a:t>22/06/2023</a:t>
+              <a:t>06/07/2023</a:t>
             </a:fld>
             <a:endParaRPr lang="en-GB"/>
           </a:p>
@@ -6981,7 +7019,7 @@
           <a:p>
             <a:fld id="{E85DF616-B21E-4EF6-A6A5-95E2FB3EB1A1}" type="datetimeFigureOut">
               <a:rPr lang="en-GB" smtClean="0"/>
-              <a:t>22/06/2023</a:t>
+              <a:t>06/07/2023</a:t>
             </a:fld>
             <a:endParaRPr lang="en-GB"/>
           </a:p>
@@ -7294,7 +7332,7 @@
           <a:p>
             <a:fld id="{E85DF616-B21E-4EF6-A6A5-95E2FB3EB1A1}" type="datetimeFigureOut">
               <a:rPr lang="en-GB" smtClean="0"/>
-              <a:t>22/06/2023</a:t>
+              <a:t>06/07/2023</a:t>
             </a:fld>
             <a:endParaRPr lang="en-GB"/>
           </a:p>
@@ -7583,7 +7621,7 @@
           <a:p>
             <a:fld id="{E85DF616-B21E-4EF6-A6A5-95E2FB3EB1A1}" type="datetimeFigureOut">
               <a:rPr lang="en-GB" smtClean="0"/>
-              <a:t>22/06/2023</a:t>
+              <a:t>06/07/2023</a:t>
             </a:fld>
             <a:endParaRPr lang="en-GB"/>
           </a:p>
@@ -7826,7 +7864,7 @@
           <a:p>
             <a:fld id="{E85DF616-B21E-4EF6-A6A5-95E2FB3EB1A1}" type="datetimeFigureOut">
               <a:rPr lang="en-GB" smtClean="0"/>
-              <a:t>22/06/2023</a:t>
+              <a:t>06/07/2023</a:t>
             </a:fld>
             <a:endParaRPr lang="en-GB"/>
           </a:p>
@@ -13386,7 +13424,7 @@
             </a:r>
             <a:r>
               <a:rPr lang="en-GB" dirty="0"/>
-              <a:t> method will transfer to the best device available for computation (device variable defined earlier, when we checked for </a:t>
+              <a:t> method will transfer to the best device available for computation (device variable was defined earlier, when we checked for </a:t>
             </a:r>
             <a:r>
               <a:rPr lang="en-GB" dirty="0" err="1"/>
@@ -14058,7 +14096,7 @@
             </a:r>
             <a:r>
               <a:rPr lang="en-GB" dirty="0"/>
-              <a:t> method will transfer to the best device available for computation (device variable defined earlier, when we checked for </a:t>
+              <a:t> method will transfer to the best device available for computation (device variable was defined earlier, when we checked for </a:t>
             </a:r>
             <a:r>
               <a:rPr lang="en-GB" dirty="0" err="1"/>
@@ -14273,7 +14311,7 @@
             </a:r>
             <a:r>
               <a:rPr lang="en-GB" dirty="0"/>
-              <a:t> method will transfer to the best device available for computation (device variable defined earlier, when we checked for </a:t>
+              <a:t> method will transfer to the best device available for computation (device variable was defined earlier, when we checked for </a:t>
             </a:r>
             <a:r>
               <a:rPr lang="en-GB" dirty="0" err="1"/>
@@ -14499,7 +14537,7 @@
             </a:pPr>
             <a:r>
               <a:rPr lang="en-GB" b="1" dirty="0"/>
-              <a:t>Keep in mind: two tensors with different devices cannot be used in the same operation! (same logic as with the </a:t>
+              <a:t>Very important: two tensors with different devices cannot be used in the same operation! (same logic as with the </a:t>
             </a:r>
             <a:r>
               <a:rPr lang="en-GB" b="1" dirty="0" err="1"/>
@@ -14711,13 +14749,13 @@
         </p:nvSpPr>
         <p:spPr>
           <a:xfrm>
-            <a:off x="838200" y="1825624"/>
-            <a:ext cx="10515600" cy="5032375"/>
+            <a:off x="838199" y="1825624"/>
+            <a:ext cx="10783529" cy="5032375"/>
           </a:xfrm>
         </p:spPr>
         <p:txBody>
           <a:bodyPr>
-            <a:normAutofit fontScale="85000" lnSpcReduction="20000"/>
+            <a:normAutofit fontScale="85000" lnSpcReduction="10000"/>
           </a:bodyPr>
           <a:lstStyle/>
           <a:p>
@@ -14729,7 +14767,7 @@
               <a:t>We will reuse our previous </a:t>
             </a:r>
             <a:r>
-              <a:rPr lang="en-GB" dirty="0" err="1"/>
+              <a:rPr lang="en-GB" b="1" dirty="0" err="1"/>
               <a:t>ShallowNeuralNet</a:t>
             </a:r>
             <a:r>
@@ -14740,49 +14778,185 @@
           <a:p>
             <a:r>
               <a:rPr lang="en-GB" dirty="0"/>
-              <a:t>implements a Shallow neural network using two fully connected layers and sigmoid activation functions,</a:t>
-            </a:r>
-          </a:p>
-          <a:p>
-            <a:r>
-              <a:rPr lang="en-GB" dirty="0"/>
-              <a:t>uses a Stochastic Mini-Batch gradient descent, with Adam as its optimizer,</a:t>
-            </a:r>
-          </a:p>
-          <a:p>
-            <a:r>
-              <a:rPr lang="en-GB" dirty="0"/>
-              <a:t>uses a random normal initialization,</a:t>
-            </a:r>
-          </a:p>
-          <a:p>
-            <a:r>
-              <a:rPr lang="en-GB" dirty="0"/>
-              <a:t>comes with a forward() method for predictions,</a:t>
-            </a:r>
-          </a:p>
-          <a:p>
-            <a:r>
-              <a:rPr lang="en-GB" dirty="0"/>
-              <a:t>comes with a backward() and train() method for backpropagation training,</a:t>
-            </a:r>
-          </a:p>
-          <a:p>
-            <a:r>
-              <a:rPr lang="en-GB" dirty="0"/>
-              <a:t>comes with a cross-entropy loss function and an accuracy calculating loss function,</a:t>
-            </a:r>
-          </a:p>
-          <a:p>
-            <a:r>
-              <a:rPr lang="en-GB" dirty="0"/>
-              <a:t>comes with a display function, to show training curves on both the loss and the accuracy,</a:t>
-            </a:r>
-          </a:p>
-          <a:p>
-            <a:r>
-              <a:rPr lang="en-GB" dirty="0"/>
-              <a:t>comes with save and load functions.</a:t>
+              <a:t>implements a Shallow neural network using </a:t>
+            </a:r>
+            <a:r>
+              <a:rPr lang="en-GB" b="1" dirty="0"/>
+              <a:t>two fully connected layers </a:t>
+            </a:r>
+            <a:r>
+              <a:rPr lang="en-GB" dirty="0"/>
+              <a:t>and </a:t>
+            </a:r>
+            <a:r>
+              <a:rPr lang="en-GB" b="1" dirty="0"/>
+              <a:t>sigmoid</a:t>
+            </a:r>
+            <a:r>
+              <a:rPr lang="en-GB" dirty="0"/>
+              <a:t> </a:t>
+            </a:r>
+            <a:r>
+              <a:rPr lang="en-GB" b="1" dirty="0"/>
+              <a:t>activation</a:t>
+            </a:r>
+            <a:r>
+              <a:rPr lang="en-GB" dirty="0"/>
+              <a:t> </a:t>
+            </a:r>
+            <a:r>
+              <a:rPr lang="en-GB" b="1" dirty="0"/>
+              <a:t>functions</a:t>
+            </a:r>
+            <a:r>
+              <a:rPr lang="en-GB" dirty="0"/>
+              <a:t>,</a:t>
+            </a:r>
+          </a:p>
+          <a:p>
+            <a:r>
+              <a:rPr lang="en-GB" dirty="0"/>
+              <a:t>uses a </a:t>
+            </a:r>
+            <a:r>
+              <a:rPr lang="en-GB" b="1" dirty="0"/>
+              <a:t>Stochastic Mini-Batch gradient descent</a:t>
+            </a:r>
+            <a:r>
+              <a:rPr lang="en-GB" dirty="0"/>
+              <a:t>, with </a:t>
+            </a:r>
+            <a:r>
+              <a:rPr lang="en-GB" b="1" dirty="0"/>
+              <a:t>Adam</a:t>
+            </a:r>
+            <a:r>
+              <a:rPr lang="en-GB" dirty="0"/>
+              <a:t> as its optimizer,</a:t>
+            </a:r>
+          </a:p>
+          <a:p>
+            <a:r>
+              <a:rPr lang="en-GB" dirty="0"/>
+              <a:t>uses a </a:t>
+            </a:r>
+            <a:r>
+              <a:rPr lang="en-GB" b="1" dirty="0"/>
+              <a:t>random normal initialization</a:t>
+            </a:r>
+            <a:r>
+              <a:rPr lang="en-GB" dirty="0"/>
+              <a:t>,</a:t>
+            </a:r>
+          </a:p>
+          <a:p>
+            <a:r>
+              <a:rPr lang="en-GB" dirty="0"/>
+              <a:t>comes with a </a:t>
+            </a:r>
+            <a:r>
+              <a:rPr lang="en-GB" b="1" dirty="0"/>
+              <a:t>forward() method </a:t>
+            </a:r>
+            <a:r>
+              <a:rPr lang="en-GB" dirty="0"/>
+              <a:t>for predictions,</a:t>
+            </a:r>
+          </a:p>
+          <a:p>
+            <a:r>
+              <a:rPr lang="en-GB" dirty="0"/>
+              <a:t>comes with </a:t>
+            </a:r>
+            <a:r>
+              <a:rPr lang="en-GB" b="1" dirty="0"/>
+              <a:t>a backward() </a:t>
+            </a:r>
+            <a:r>
+              <a:rPr lang="en-GB" dirty="0"/>
+              <a:t>and </a:t>
+            </a:r>
+            <a:r>
+              <a:rPr lang="en-GB" b="1" dirty="0"/>
+              <a:t>train() method </a:t>
+            </a:r>
+            <a:r>
+              <a:rPr lang="en-GB" dirty="0"/>
+              <a:t>for backpropagation training,</a:t>
+            </a:r>
+          </a:p>
+          <a:p>
+            <a:r>
+              <a:rPr lang="en-GB" dirty="0"/>
+              <a:t>comes with a </a:t>
+            </a:r>
+            <a:r>
+              <a:rPr lang="en-GB" b="1" dirty="0"/>
+              <a:t>cross-entropy loss function </a:t>
+            </a:r>
+            <a:r>
+              <a:rPr lang="en-GB" dirty="0"/>
+              <a:t>and an </a:t>
+            </a:r>
+            <a:r>
+              <a:rPr lang="en-GB" b="1" dirty="0"/>
+              <a:t>accuracy metric function</a:t>
+            </a:r>
+            <a:r>
+              <a:rPr lang="en-GB" dirty="0"/>
+              <a:t>,</a:t>
+            </a:r>
+          </a:p>
+          <a:p>
+            <a:r>
+              <a:rPr lang="en-GB" dirty="0"/>
+              <a:t>comes with a </a:t>
+            </a:r>
+            <a:r>
+              <a:rPr lang="en-GB" b="1" dirty="0"/>
+              <a:t>display</a:t>
+            </a:r>
+            <a:r>
+              <a:rPr lang="en-GB" dirty="0"/>
+              <a:t> function, to show </a:t>
+            </a:r>
+            <a:r>
+              <a:rPr lang="en-GB" b="1" dirty="0"/>
+              <a:t>training curves </a:t>
+            </a:r>
+            <a:r>
+              <a:rPr lang="en-GB" dirty="0"/>
+              <a:t>on both the loss and the accuracy,</a:t>
+            </a:r>
+          </a:p>
+          <a:p>
+            <a:r>
+              <a:rPr lang="en-GB" dirty="0"/>
+              <a:t>comes with </a:t>
+            </a:r>
+            <a:r>
+              <a:rPr lang="en-GB" b="1" dirty="0"/>
+              <a:t>save</a:t>
+            </a:r>
+            <a:r>
+              <a:rPr lang="en-GB" dirty="0"/>
+              <a:t> and </a:t>
+            </a:r>
+            <a:r>
+              <a:rPr lang="en-GB" b="1" dirty="0"/>
+              <a:t>load</a:t>
+            </a:r>
+            <a:r>
+              <a:rPr lang="en-GB" dirty="0"/>
+              <a:t> </a:t>
+            </a:r>
+            <a:r>
+              <a:rPr lang="en-GB" b="1" dirty="0"/>
+              <a:t>functions</a:t>
+            </a:r>
+            <a:r>
+              <a:rPr lang="en-GB" dirty="0"/>
+              <a:t>.</a:t>
             </a:r>
           </a:p>
           <a:p>
@@ -16757,7 +16931,7 @@
         </p:spPr>
         <p:txBody>
           <a:bodyPr>
-            <a:normAutofit fontScale="85000" lnSpcReduction="10000"/>
+            <a:normAutofit fontScale="92500" lnSpcReduction="10000"/>
           </a:bodyPr>
           <a:lstStyle/>
           <a:p>
@@ -16774,15 +16948,7 @@
             </a:r>
             <a:r>
               <a:rPr lang="en-GB" dirty="0"/>
-              <a:t> Tensor skills, you may try to manually implement your own version of typical algorithms we ran on lists/</a:t>
-            </a:r>
-            <a:r>
-              <a:rPr lang="en-GB" dirty="0" err="1"/>
-              <a:t>Numpy</a:t>
-            </a:r>
-            <a:r>
-              <a:rPr lang="en-GB" dirty="0"/>
-              <a:t> arrays in previous classes, using the basic operations on </a:t>
+              <a:t> Tensor skills, you may try to manually implement some typical algorithms using the basic operations on </a:t>
             </a:r>
             <a:r>
               <a:rPr lang="en-GB" dirty="0" err="1"/>
@@ -16790,7 +16956,37 @@
             </a:r>
             <a:r>
               <a:rPr lang="en-GB" dirty="0"/>
-              <a:t> tensors.</a:t>
+              <a:t> tensors:</a:t>
+            </a:r>
+          </a:p>
+          <a:p>
+            <a:r>
+              <a:rPr lang="en-GB" dirty="0"/>
+              <a:t>Finding the maximum, minimum, average, median values of a given 1D tensor,</a:t>
+            </a:r>
+          </a:p>
+          <a:p>
+            <a:r>
+              <a:rPr lang="en-GB" dirty="0"/>
+              <a:t>Transposing a given 2D tensor, computing its determinant, eigenvalues/eigenvectors,</a:t>
+            </a:r>
+          </a:p>
+          <a:p>
+            <a:r>
+              <a:rPr lang="en-GB" dirty="0"/>
+              <a:t>Sorting a given 1D tensor (bubble sort, insertion sort, selection sort, quick sort, merge sort),</a:t>
+            </a:r>
+          </a:p>
+          <a:p>
+            <a:r>
+              <a:rPr lang="en-GB" dirty="0"/>
+              <a:t>Generating a 1D array containing the first K Fibonacci numbers with K given,</a:t>
+            </a:r>
+          </a:p>
+          <a:p>
+            <a:r>
+              <a:rPr lang="en-GB" dirty="0"/>
+              <a:t>Etc.</a:t>
             </a:r>
           </a:p>
           <a:p>
@@ -16799,45 +16995,6 @@
             </a:pPr>
             <a:r>
               <a:rPr lang="en-GB" dirty="0"/>
-              <a:t>For instance, try writing algorithms:</a:t>
-            </a:r>
-          </a:p>
-          <a:p>
-            <a:r>
-              <a:rPr lang="en-GB" dirty="0"/>
-              <a:t>Finding the maximum, minimum, average, median values of a given 1D tensor,</a:t>
-            </a:r>
-          </a:p>
-          <a:p>
-            <a:r>
-              <a:rPr lang="en-GB" dirty="0"/>
-              <a:t>Transposing a given 2D tensor, computing its determinant, eigenvalues/eigenvectors,</a:t>
-            </a:r>
-          </a:p>
-          <a:p>
-            <a:r>
-              <a:rPr lang="en-GB" dirty="0"/>
-              <a:t>Sorting a given 1D tensor (bubble sort, insertion sort, selection sort, quick sort, merge sort),</a:t>
-            </a:r>
-          </a:p>
-          <a:p>
-            <a:r>
-              <a:rPr lang="en-GB" dirty="0"/>
-              <a:t>Generating a 1D array containing the first K Fibonacci numbers with K given,</a:t>
-            </a:r>
-          </a:p>
-          <a:p>
-            <a:r>
-              <a:rPr lang="en-GB" dirty="0"/>
-              <a:t>Etc.</a:t>
-            </a:r>
-          </a:p>
-          <a:p>
-            <a:pPr marL="0" indent="0">
-              <a:buNone/>
-            </a:pPr>
-            <a:r>
-              <a:rPr lang="en-GB" dirty="0"/>
               <a:t>Later, you can check their performance times compared to their </a:t>
             </a:r>
             <a:r>
@@ -16854,13 +17011,12 @@
             </a:r>
             <a:r>
               <a:rPr lang="en-GB" dirty="0"/>
-              <a:t> implementations when running them on both CPU and CUDA (if available).</a:t>
-            </a:r>
-          </a:p>
-          <a:p>
-            <a:pPr marL="0" indent="0">
-              <a:buNone/>
-            </a:pPr>
+              <a:t> implementations when running them on CPU </a:t>
+            </a:r>
+            <a:r>
+              <a:rPr lang="en-GB"/>
+              <a:t>and CUDA. </a:t>
+            </a:r>
             <a:r>
               <a:rPr lang="en-GB" dirty="0"/>
               <a:t>In which scenarios is it slower to implement said functions and run them on GPU?</a:t>

</xml_diff>

<commit_message>
Final touches to syllabus, W1, W2 and W3 materials.
</commit_message>
<xml_diff>
--- a/W3/1. W3S1 final/W3S1.pptx
+++ b/W3/1. W3S1 final/W3S1.pptx
@@ -256,6 +256,14 @@
 </p:presentation>
 </file>
 
+<file path=ppt/revisionInfo.xml><?xml version="1.0" encoding="utf-8"?>
+<p1510:revInfo xmlns:a="http://schemas.openxmlformats.org/drawingml/2006/main" xmlns:r="http://schemas.openxmlformats.org/officeDocument/2006/relationships" xmlns:p1510="http://schemas.microsoft.com/office/powerpoint/2015/10/main">
+  <p1510:revLst>
+    <p1510:client id="{247D1BAE-CADF-480A-BB5E-27902C69550B}" v="5" dt="2024-01-21T10:04:26.838"/>
+  </p1510:revLst>
+</p1510:revInfo>
+</file>
+
 <file path=ppt/changesInfos/changesInfo1.xml><?xml version="1.0" encoding="utf-8"?>
 <pc:chgInfo xmlns:a="http://schemas.openxmlformats.org/drawingml/2006/main" xmlns:r="http://schemas.openxmlformats.org/officeDocument/2006/relationships" xmlns:ac="http://schemas.microsoft.com/office/drawing/2013/main/command" xmlns:pc="http://schemas.microsoft.com/office/powerpoint/2013/main/command">
   <pc:docChgLst>
@@ -4688,6 +4696,229 @@
             <pc:docMk/>
             <pc:sldMk cId="2509505199" sldId="786"/>
             <ac:spMk id="3" creationId="{088657BF-BB53-D488-1F2B-77F25EDE3A56}"/>
+          </ac:spMkLst>
+        </pc:spChg>
+      </pc:sldChg>
+    </pc:docChg>
+  </pc:docChgLst>
+  <pc:docChgLst>
+    <pc:chgData name="Matthieu De Mari" userId="dfb708c9-d8dc-439f-9a3b-c772bf4a311c" providerId="ADAL" clId="{247D1BAE-CADF-480A-BB5E-27902C69550B}"/>
+    <pc:docChg chg="undo custSel modSld">
+      <pc:chgData name="Matthieu De Mari" userId="dfb708c9-d8dc-439f-9a3b-c772bf4a311c" providerId="ADAL" clId="{247D1BAE-CADF-480A-BB5E-27902C69550B}" dt="2024-01-21T10:04:42.295" v="194" actId="20577"/>
+      <pc:docMkLst>
+        <pc:docMk/>
+      </pc:docMkLst>
+      <pc:sldChg chg="modSp mod">
+        <pc:chgData name="Matthieu De Mari" userId="dfb708c9-d8dc-439f-9a3b-c772bf4a311c" providerId="ADAL" clId="{247D1BAE-CADF-480A-BB5E-27902C69550B}" dt="2024-01-21T10:00:56.720" v="4" actId="20577"/>
+        <pc:sldMkLst>
+          <pc:docMk/>
+          <pc:sldMk cId="1970187575" sldId="379"/>
+        </pc:sldMkLst>
+        <pc:spChg chg="mod">
+          <ac:chgData name="Matthieu De Mari" userId="dfb708c9-d8dc-439f-9a3b-c772bf4a311c" providerId="ADAL" clId="{247D1BAE-CADF-480A-BB5E-27902C69550B}" dt="2024-01-21T10:00:56.720" v="4" actId="20577"/>
+          <ac:spMkLst>
+            <pc:docMk/>
+            <pc:sldMk cId="1970187575" sldId="379"/>
+            <ac:spMk id="5" creationId="{DF664FFA-9452-2803-1619-F2562904679D}"/>
+          </ac:spMkLst>
+        </pc:spChg>
+      </pc:sldChg>
+      <pc:sldChg chg="addSp delSp modSp mod">
+        <pc:chgData name="Matthieu De Mari" userId="dfb708c9-d8dc-439f-9a3b-c772bf4a311c" providerId="ADAL" clId="{247D1BAE-CADF-480A-BB5E-27902C69550B}" dt="2024-01-21T10:04:29.079" v="174" actId="20577"/>
+        <pc:sldMkLst>
+          <pc:docMk/>
+          <pc:sldMk cId="2100436947" sldId="380"/>
+        </pc:sldMkLst>
+        <pc:spChg chg="del mod">
+          <ac:chgData name="Matthieu De Mari" userId="dfb708c9-d8dc-439f-9a3b-c772bf4a311c" providerId="ADAL" clId="{247D1BAE-CADF-480A-BB5E-27902C69550B}" dt="2024-01-21T10:04:23.801" v="171" actId="478"/>
+          <ac:spMkLst>
+            <pc:docMk/>
+            <pc:sldMk cId="2100436947" sldId="380"/>
+            <ac:spMk id="4" creationId="{11F8287B-68F9-6307-9899-F1C2672A4FC6}"/>
+          </ac:spMkLst>
+        </pc:spChg>
+        <pc:spChg chg="add del mod">
+          <ac:chgData name="Matthieu De Mari" userId="dfb708c9-d8dc-439f-9a3b-c772bf4a311c" providerId="ADAL" clId="{247D1BAE-CADF-480A-BB5E-27902C69550B}" dt="2024-01-21T10:04:26.223" v="172" actId="478"/>
+          <ac:spMkLst>
+            <pc:docMk/>
+            <pc:sldMk cId="2100436947" sldId="380"/>
+            <ac:spMk id="5" creationId="{894FF218-8442-21A9-7DB0-48B57745EF16}"/>
+          </ac:spMkLst>
+        </pc:spChg>
+        <pc:spChg chg="add mod">
+          <ac:chgData name="Matthieu De Mari" userId="dfb708c9-d8dc-439f-9a3b-c772bf4a311c" providerId="ADAL" clId="{247D1BAE-CADF-480A-BB5E-27902C69550B}" dt="2024-01-21T10:04:29.079" v="174" actId="20577"/>
+          <ac:spMkLst>
+            <pc:docMk/>
+            <pc:sldMk cId="2100436947" sldId="380"/>
+            <ac:spMk id="6" creationId="{D7DD82EB-95E2-C9DB-F4EA-EEAA4EF9034D}"/>
+          </ac:spMkLst>
+        </pc:spChg>
+      </pc:sldChg>
+      <pc:sldChg chg="modSp mod">
+        <pc:chgData name="Matthieu De Mari" userId="dfb708c9-d8dc-439f-9a3b-c772bf4a311c" providerId="ADAL" clId="{247D1BAE-CADF-480A-BB5E-27902C69550B}" dt="2024-01-21T10:01:54.988" v="85" actId="5793"/>
+        <pc:sldMkLst>
+          <pc:docMk/>
+          <pc:sldMk cId="3179138343" sldId="413"/>
+        </pc:sldMkLst>
+        <pc:spChg chg="mod">
+          <ac:chgData name="Matthieu De Mari" userId="dfb708c9-d8dc-439f-9a3b-c772bf4a311c" providerId="ADAL" clId="{247D1BAE-CADF-480A-BB5E-27902C69550B}" dt="2024-01-21T10:01:54.988" v="85" actId="5793"/>
+          <ac:spMkLst>
+            <pc:docMk/>
+            <pc:sldMk cId="3179138343" sldId="413"/>
+            <ac:spMk id="5" creationId="{4BC25369-B12F-4AC1-0A2A-B7362924B819}"/>
+          </ac:spMkLst>
+        </pc:spChg>
+        <pc:picChg chg="mod">
+          <ac:chgData name="Matthieu De Mari" userId="dfb708c9-d8dc-439f-9a3b-c772bf4a311c" providerId="ADAL" clId="{247D1BAE-CADF-480A-BB5E-27902C69550B}" dt="2024-01-21T10:01:39.198" v="6" actId="14100"/>
+          <ac:picMkLst>
+            <pc:docMk/>
+            <pc:sldMk cId="3179138343" sldId="413"/>
+            <ac:picMk id="7" creationId="{8A2A851B-519D-6246-1325-49AE148D423B}"/>
+          </ac:picMkLst>
+        </pc:picChg>
+      </pc:sldChg>
+      <pc:sldChg chg="modSp mod">
+        <pc:chgData name="Matthieu De Mari" userId="dfb708c9-d8dc-439f-9a3b-c772bf4a311c" providerId="ADAL" clId="{247D1BAE-CADF-480A-BB5E-27902C69550B}" dt="2024-01-21T10:02:29.240" v="96"/>
+        <pc:sldMkLst>
+          <pc:docMk/>
+          <pc:sldMk cId="1324969895" sldId="414"/>
+        </pc:sldMkLst>
+        <pc:spChg chg="mod">
+          <ac:chgData name="Matthieu De Mari" userId="dfb708c9-d8dc-439f-9a3b-c772bf4a311c" providerId="ADAL" clId="{247D1BAE-CADF-480A-BB5E-27902C69550B}" dt="2024-01-21T10:02:29.240" v="96"/>
+          <ac:spMkLst>
+            <pc:docMk/>
+            <pc:sldMk cId="1324969895" sldId="414"/>
+            <ac:spMk id="5" creationId="{60D93335-8A92-D60B-8902-7A5CD0AD4E90}"/>
+          </ac:spMkLst>
+        </pc:spChg>
+      </pc:sldChg>
+      <pc:sldChg chg="modSp mod">
+        <pc:chgData name="Matthieu De Mari" userId="dfb708c9-d8dc-439f-9a3b-c772bf4a311c" providerId="ADAL" clId="{247D1BAE-CADF-480A-BB5E-27902C69550B}" dt="2024-01-21T10:02:25.292" v="95" actId="20577"/>
+        <pc:sldMkLst>
+          <pc:docMk/>
+          <pc:sldMk cId="481166971" sldId="415"/>
+        </pc:sldMkLst>
+        <pc:spChg chg="mod">
+          <ac:chgData name="Matthieu De Mari" userId="dfb708c9-d8dc-439f-9a3b-c772bf4a311c" providerId="ADAL" clId="{247D1BAE-CADF-480A-BB5E-27902C69550B}" dt="2024-01-21T10:02:25.292" v="95" actId="20577"/>
+          <ac:spMkLst>
+            <pc:docMk/>
+            <pc:sldMk cId="481166971" sldId="415"/>
+            <ac:spMk id="5" creationId="{60D93335-8A92-D60B-8902-7A5CD0AD4E90}"/>
+          </ac:spMkLst>
+        </pc:spChg>
+      </pc:sldChg>
+      <pc:sldChg chg="modSp mod">
+        <pc:chgData name="Matthieu De Mari" userId="dfb708c9-d8dc-439f-9a3b-c772bf4a311c" providerId="ADAL" clId="{247D1BAE-CADF-480A-BB5E-27902C69550B}" dt="2024-01-21T10:02:33.099" v="97"/>
+        <pc:sldMkLst>
+          <pc:docMk/>
+          <pc:sldMk cId="4050702309" sldId="416"/>
+        </pc:sldMkLst>
+        <pc:spChg chg="mod">
+          <ac:chgData name="Matthieu De Mari" userId="dfb708c9-d8dc-439f-9a3b-c772bf4a311c" providerId="ADAL" clId="{247D1BAE-CADF-480A-BB5E-27902C69550B}" dt="2024-01-21T10:02:33.099" v="97"/>
+          <ac:spMkLst>
+            <pc:docMk/>
+            <pc:sldMk cId="4050702309" sldId="416"/>
+            <ac:spMk id="5" creationId="{60D93335-8A92-D60B-8902-7A5CD0AD4E90}"/>
+          </ac:spMkLst>
+        </pc:spChg>
+      </pc:sldChg>
+      <pc:sldChg chg="modSp mod">
+        <pc:chgData name="Matthieu De Mari" userId="dfb708c9-d8dc-439f-9a3b-c772bf4a311c" providerId="ADAL" clId="{247D1BAE-CADF-480A-BB5E-27902C69550B}" dt="2024-01-21T10:02:37.066" v="98"/>
+        <pc:sldMkLst>
+          <pc:docMk/>
+          <pc:sldMk cId="4249457938" sldId="417"/>
+        </pc:sldMkLst>
+        <pc:spChg chg="mod">
+          <ac:chgData name="Matthieu De Mari" userId="dfb708c9-d8dc-439f-9a3b-c772bf4a311c" providerId="ADAL" clId="{247D1BAE-CADF-480A-BB5E-27902C69550B}" dt="2024-01-21T10:02:37.066" v="98"/>
+          <ac:spMkLst>
+            <pc:docMk/>
+            <pc:sldMk cId="4249457938" sldId="417"/>
+            <ac:spMk id="5" creationId="{60D93335-8A92-D60B-8902-7A5CD0AD4E90}"/>
+          </ac:spMkLst>
+        </pc:spChg>
+      </pc:sldChg>
+      <pc:sldChg chg="addSp delSp modSp mod">
+        <pc:chgData name="Matthieu De Mari" userId="dfb708c9-d8dc-439f-9a3b-c772bf4a311c" providerId="ADAL" clId="{247D1BAE-CADF-480A-BB5E-27902C69550B}" dt="2024-01-21T10:04:19.807" v="170" actId="20577"/>
+        <pc:sldMkLst>
+          <pc:docMk/>
+          <pc:sldMk cId="3310153579" sldId="418"/>
+        </pc:sldMkLst>
+        <pc:spChg chg="del">
+          <ac:chgData name="Matthieu De Mari" userId="dfb708c9-d8dc-439f-9a3b-c772bf4a311c" providerId="ADAL" clId="{247D1BAE-CADF-480A-BB5E-27902C69550B}" dt="2024-01-21T10:04:07.839" v="161" actId="478"/>
+          <ac:spMkLst>
+            <pc:docMk/>
+            <pc:sldMk cId="3310153579" sldId="418"/>
+            <ac:spMk id="4" creationId="{11F8287B-68F9-6307-9899-F1C2672A4FC6}"/>
+          </ac:spMkLst>
+        </pc:spChg>
+        <pc:spChg chg="add del mod">
+          <ac:chgData name="Matthieu De Mari" userId="dfb708c9-d8dc-439f-9a3b-c772bf4a311c" providerId="ADAL" clId="{247D1BAE-CADF-480A-BB5E-27902C69550B}" dt="2024-01-21T10:04:14.521" v="166" actId="478"/>
+          <ac:spMkLst>
+            <pc:docMk/>
+            <pc:sldMk cId="3310153579" sldId="418"/>
+            <ac:spMk id="6" creationId="{A1D98473-16F0-9097-13BA-873990780752}"/>
+          </ac:spMkLst>
+        </pc:spChg>
+        <pc:spChg chg="add mod">
+          <ac:chgData name="Matthieu De Mari" userId="dfb708c9-d8dc-439f-9a3b-c772bf4a311c" providerId="ADAL" clId="{247D1BAE-CADF-480A-BB5E-27902C69550B}" dt="2024-01-21T10:04:11.110" v="165"/>
+          <ac:spMkLst>
+            <pc:docMk/>
+            <pc:sldMk cId="3310153579" sldId="418"/>
+            <ac:spMk id="7" creationId="{6F8136A8-3359-28EA-0AF2-830A6E8E4F5A}"/>
+          </ac:spMkLst>
+        </pc:spChg>
+        <pc:spChg chg="add mod">
+          <ac:chgData name="Matthieu De Mari" userId="dfb708c9-d8dc-439f-9a3b-c772bf4a311c" providerId="ADAL" clId="{247D1BAE-CADF-480A-BB5E-27902C69550B}" dt="2024-01-21T10:04:19.807" v="170" actId="20577"/>
+          <ac:spMkLst>
+            <pc:docMk/>
+            <pc:sldMk cId="3310153579" sldId="418"/>
+            <ac:spMk id="8" creationId="{95E6B02B-00D1-4B97-B7BC-916C0CB69899}"/>
+          </ac:spMkLst>
+        </pc:spChg>
+      </pc:sldChg>
+      <pc:sldChg chg="addSp delSp modSp mod">
+        <pc:chgData name="Matthieu De Mari" userId="dfb708c9-d8dc-439f-9a3b-c772bf4a311c" providerId="ADAL" clId="{247D1BAE-CADF-480A-BB5E-27902C69550B}" dt="2024-01-21T10:04:03.136" v="160" actId="20577"/>
+        <pc:sldMkLst>
+          <pc:docMk/>
+          <pc:sldMk cId="1163891923" sldId="419"/>
+        </pc:sldMkLst>
+        <pc:spChg chg="del">
+          <ac:chgData name="Matthieu De Mari" userId="dfb708c9-d8dc-439f-9a3b-c772bf4a311c" providerId="ADAL" clId="{247D1BAE-CADF-480A-BB5E-27902C69550B}" dt="2024-01-21T10:03:56.893" v="157" actId="478"/>
+          <ac:spMkLst>
+            <pc:docMk/>
+            <pc:sldMk cId="1163891923" sldId="419"/>
+            <ac:spMk id="4" creationId="{11F8287B-68F9-6307-9899-F1C2672A4FC6}"/>
+          </ac:spMkLst>
+        </pc:spChg>
+        <pc:spChg chg="add del mod">
+          <ac:chgData name="Matthieu De Mari" userId="dfb708c9-d8dc-439f-9a3b-c772bf4a311c" providerId="ADAL" clId="{247D1BAE-CADF-480A-BB5E-27902C69550B}" dt="2024-01-21T10:03:58.583" v="158" actId="478"/>
+          <ac:spMkLst>
+            <pc:docMk/>
+            <pc:sldMk cId="1163891923" sldId="419"/>
+            <ac:spMk id="6" creationId="{DAF49DD2-B687-5986-5756-5570DD6B1DB0}"/>
+          </ac:spMkLst>
+        </pc:spChg>
+        <pc:spChg chg="add mod">
+          <ac:chgData name="Matthieu De Mari" userId="dfb708c9-d8dc-439f-9a3b-c772bf4a311c" providerId="ADAL" clId="{247D1BAE-CADF-480A-BB5E-27902C69550B}" dt="2024-01-21T10:04:03.136" v="160" actId="20577"/>
+          <ac:spMkLst>
+            <pc:docMk/>
+            <pc:sldMk cId="1163891923" sldId="419"/>
+            <ac:spMk id="7" creationId="{0BFBA435-DBD0-76FC-67E1-9A809C6F4DB4}"/>
+          </ac:spMkLst>
+        </pc:spChg>
+      </pc:sldChg>
+      <pc:sldChg chg="modSp mod">
+        <pc:chgData name="Matthieu De Mari" userId="dfb708c9-d8dc-439f-9a3b-c772bf4a311c" providerId="ADAL" clId="{247D1BAE-CADF-480A-BB5E-27902C69550B}" dt="2024-01-21T10:04:42.295" v="194" actId="20577"/>
+        <pc:sldMkLst>
+          <pc:docMk/>
+          <pc:sldMk cId="1773283043" sldId="420"/>
+        </pc:sldMkLst>
+        <pc:spChg chg="mod">
+          <ac:chgData name="Matthieu De Mari" userId="dfb708c9-d8dc-439f-9a3b-c772bf4a311c" providerId="ADAL" clId="{247D1BAE-CADF-480A-BB5E-27902C69550B}" dt="2024-01-21T10:04:42.295" v="194" actId="20577"/>
+          <ac:spMkLst>
+            <pc:docMk/>
+            <pc:sldMk cId="1773283043" sldId="420"/>
+            <ac:spMk id="4" creationId="{11F8287B-68F9-6307-9899-F1C2672A4FC6}"/>
           </ac:spMkLst>
         </pc:spChg>
       </pc:sldChg>
@@ -4778,7 +5009,7 @@
           <a:p>
             <a:fld id="{61478373-EB31-4867-8CF0-FA31364748A5}" type="datetimeFigureOut">
               <a:rPr lang="en-GB" smtClean="0"/>
-              <a:t>06/07/2023</a:t>
+              <a:t>21/01/2024</a:t>
             </a:fld>
             <a:endParaRPr lang="en-GB"/>
           </a:p>
@@ -5195,7 +5426,7 @@
           <a:p>
             <a:fld id="{E85DF616-B21E-4EF6-A6A5-95E2FB3EB1A1}" type="datetimeFigureOut">
               <a:rPr lang="en-GB" smtClean="0"/>
-              <a:t>06/07/2023</a:t>
+              <a:t>21/01/2024</a:t>
             </a:fld>
             <a:endParaRPr lang="en-GB"/>
           </a:p>
@@ -5395,7 +5626,7 @@
           <a:p>
             <a:fld id="{E85DF616-B21E-4EF6-A6A5-95E2FB3EB1A1}" type="datetimeFigureOut">
               <a:rPr lang="en-GB" smtClean="0"/>
-              <a:t>06/07/2023</a:t>
+              <a:t>21/01/2024</a:t>
             </a:fld>
             <a:endParaRPr lang="en-GB"/>
           </a:p>
@@ -5605,7 +5836,7 @@
           <a:p>
             <a:fld id="{E85DF616-B21E-4EF6-A6A5-95E2FB3EB1A1}" type="datetimeFigureOut">
               <a:rPr lang="en-GB" smtClean="0"/>
-              <a:t>06/07/2023</a:t>
+              <a:t>21/01/2024</a:t>
             </a:fld>
             <a:endParaRPr lang="en-GB"/>
           </a:p>
@@ -5805,7 +6036,7 @@
           <a:p>
             <a:fld id="{E85DF616-B21E-4EF6-A6A5-95E2FB3EB1A1}" type="datetimeFigureOut">
               <a:rPr lang="en-GB" smtClean="0"/>
-              <a:t>06/07/2023</a:t>
+              <a:t>21/01/2024</a:t>
             </a:fld>
             <a:endParaRPr lang="en-GB"/>
           </a:p>
@@ -6081,7 +6312,7 @@
           <a:p>
             <a:fld id="{E85DF616-B21E-4EF6-A6A5-95E2FB3EB1A1}" type="datetimeFigureOut">
               <a:rPr lang="en-GB" smtClean="0"/>
-              <a:t>06/07/2023</a:t>
+              <a:t>21/01/2024</a:t>
             </a:fld>
             <a:endParaRPr lang="en-GB"/>
           </a:p>
@@ -6349,7 +6580,7 @@
           <a:p>
             <a:fld id="{E85DF616-B21E-4EF6-A6A5-95E2FB3EB1A1}" type="datetimeFigureOut">
               <a:rPr lang="en-GB" smtClean="0"/>
-              <a:t>06/07/2023</a:t>
+              <a:t>21/01/2024</a:t>
             </a:fld>
             <a:endParaRPr lang="en-GB"/>
           </a:p>
@@ -6764,7 +6995,7 @@
           <a:p>
             <a:fld id="{E85DF616-B21E-4EF6-A6A5-95E2FB3EB1A1}" type="datetimeFigureOut">
               <a:rPr lang="en-GB" smtClean="0"/>
-              <a:t>06/07/2023</a:t>
+              <a:t>21/01/2024</a:t>
             </a:fld>
             <a:endParaRPr lang="en-GB"/>
           </a:p>
@@ -6906,7 +7137,7 @@
           <a:p>
             <a:fld id="{E85DF616-B21E-4EF6-A6A5-95E2FB3EB1A1}" type="datetimeFigureOut">
               <a:rPr lang="en-GB" smtClean="0"/>
-              <a:t>06/07/2023</a:t>
+              <a:t>21/01/2024</a:t>
             </a:fld>
             <a:endParaRPr lang="en-GB"/>
           </a:p>
@@ -7019,7 +7250,7 @@
           <a:p>
             <a:fld id="{E85DF616-B21E-4EF6-A6A5-95E2FB3EB1A1}" type="datetimeFigureOut">
               <a:rPr lang="en-GB" smtClean="0"/>
-              <a:t>06/07/2023</a:t>
+              <a:t>21/01/2024</a:t>
             </a:fld>
             <a:endParaRPr lang="en-GB"/>
           </a:p>
@@ -7332,7 +7563,7 @@
           <a:p>
             <a:fld id="{E85DF616-B21E-4EF6-A6A5-95E2FB3EB1A1}" type="datetimeFigureOut">
               <a:rPr lang="en-GB" smtClean="0"/>
-              <a:t>06/07/2023</a:t>
+              <a:t>21/01/2024</a:t>
             </a:fld>
             <a:endParaRPr lang="en-GB"/>
           </a:p>
@@ -7621,7 +7852,7 @@
           <a:p>
             <a:fld id="{E85DF616-B21E-4EF6-A6A5-95E2FB3EB1A1}" type="datetimeFigureOut">
               <a:rPr lang="en-GB" smtClean="0"/>
-              <a:t>06/07/2023</a:t>
+              <a:t>21/01/2024</a:t>
             </a:fld>
             <a:endParaRPr lang="en-GB"/>
           </a:p>
@@ -7864,7 +8095,7 @@
           <a:p>
             <a:fld id="{E85DF616-B21E-4EF6-A6A5-95E2FB3EB1A1}" type="datetimeFigureOut">
               <a:rPr lang="en-GB" smtClean="0"/>
-              <a:t>06/07/2023</a:t>
+              <a:t>21/01/2024</a:t>
             </a:fld>
             <a:endParaRPr lang="en-GB"/>
           </a:p>
@@ -10311,7 +10542,15 @@
           <a:p>
             <a:r>
               <a:rPr lang="en-GB" dirty="0"/>
-              <a:t>Tensors come with many attributes and methods, e.g. asking the shape of a tensor, like in NumPy, is done using the </a:t>
+              <a:t>Tensors come with </a:t>
+            </a:r>
+            <a:r>
+              <a:rPr lang="en-GB" b="1" dirty="0"/>
+              <a:t>many attributes and methods</a:t>
+            </a:r>
+            <a:r>
+              <a:rPr lang="en-GB" dirty="0"/>
+              <a:t>, e.g. asking the shape of a tensor, like in NumPy, is done using the </a:t>
             </a:r>
             <a:r>
               <a:rPr lang="en-GB" b="1" dirty="0"/>
@@ -10320,6 +10559,24 @@
             <a:r>
               <a:rPr lang="en-GB" dirty="0"/>
               <a:t> attribute.</a:t>
+            </a:r>
+          </a:p>
+          <a:p>
+            <a:endParaRPr lang="en-GB" dirty="0"/>
+          </a:p>
+          <a:p>
+            <a:endParaRPr lang="en-GB" dirty="0"/>
+          </a:p>
+          <a:p>
+            <a:endParaRPr lang="en-GB" dirty="0"/>
+          </a:p>
+          <a:p>
+            <a:endParaRPr lang="en-GB" dirty="0"/>
+          </a:p>
+          <a:p>
+            <a:r>
+              <a:rPr lang="en-GB" dirty="0"/>
+              <a:t>Not planning to cover all of these attributes and methods, because…</a:t>
             </a:r>
           </a:p>
         </p:txBody>
@@ -10346,8 +10603,8 @@
         </p:blipFill>
         <p:spPr>
           <a:xfrm>
-            <a:off x="1079515" y="2883455"/>
-            <a:ext cx="3296110" cy="809738"/>
+            <a:off x="1079515" y="2883454"/>
+            <a:ext cx="5032310" cy="1236261"/>
           </a:xfrm>
           <a:prstGeom prst="rect">
             <a:avLst/>
@@ -10592,7 +10849,7 @@
             </a:pPr>
             <a:r>
               <a:rPr lang="en-GB" dirty="0"/>
-              <a:t>All the typical element-wise operations work on tensors. For instance, we can:</a:t>
+              <a:t>All the typical element-wise operations on arrays work on tensors. For instance, we can:</a:t>
             </a:r>
           </a:p>
           <a:p>
@@ -10827,7 +11084,7 @@
             </a:pPr>
             <a:r>
               <a:rPr lang="en-GB" dirty="0"/>
-              <a:t>All the typical element-wise operations work on tensors. For instance, we can:</a:t>
+              <a:t>All the typical element-wise operations on arrays work on tensors. For instance, we can:</a:t>
             </a:r>
           </a:p>
           <a:p>
@@ -11054,7 +11311,7 @@
             </a:pPr>
             <a:r>
               <a:rPr lang="en-GB" dirty="0"/>
-              <a:t>All the typical element-wise operations work on tensors. For instance, we can:</a:t>
+              <a:t>All the typical element-wise operations on arrays work on tensors. For instance, we can:</a:t>
             </a:r>
           </a:p>
           <a:p>
@@ -11670,7 +11927,7 @@
             </a:pPr>
             <a:r>
               <a:rPr lang="en-GB" dirty="0"/>
-              <a:t>All the typical element-wise operations work on tensors. For instance, we can:</a:t>
+              <a:t>All the typical element-wise operations on arrays work on tensors. For instance, we can:</a:t>
             </a:r>
           </a:p>
           <a:p>
@@ -11828,93 +12085,6 @@
           </a:p>
         </p:txBody>
       </p:sp>
-      <p:sp>
-        <p:nvSpPr>
-          <p:cNvPr id="4" name="Content Placeholder 3">
-            <a:extLst>
-              <a:ext uri="{FF2B5EF4-FFF2-40B4-BE49-F238E27FC236}">
-                <a16:creationId xmlns:a16="http://schemas.microsoft.com/office/drawing/2014/main" id="{11F8287B-68F9-6307-9899-F1C2672A4FC6}"/>
-              </a:ext>
-            </a:extLst>
-          </p:cNvPr>
-          <p:cNvSpPr>
-            <a:spLocks noGrp="1"/>
-          </p:cNvSpPr>
-          <p:nvPr>
-            <p:ph sz="half" idx="1"/>
-          </p:nvPr>
-        </p:nvSpPr>
-        <p:spPr>
-          <a:xfrm>
-            <a:off x="838200" y="1825624"/>
-            <a:ext cx="5181600" cy="5032375"/>
-          </a:xfrm>
-        </p:spPr>
-        <p:txBody>
-          <a:bodyPr>
-            <a:normAutofit lnSpcReduction="10000"/>
-          </a:bodyPr>
-          <a:lstStyle/>
-          <a:p>
-            <a:pPr marL="0" indent="0">
-              <a:buNone/>
-            </a:pPr>
-            <a:r>
-              <a:rPr lang="en-GB" dirty="0"/>
-              <a:t>All NumPy array operations work on Tensors and equivalent methods have been written in torch as well.</a:t>
-            </a:r>
-          </a:p>
-          <a:p>
-            <a:r>
-              <a:rPr lang="en-GB" dirty="0"/>
-              <a:t>Element-wise Addition/Subtraction,</a:t>
-            </a:r>
-          </a:p>
-          <a:p>
-            <a:r>
-              <a:rPr lang="en-GB" dirty="0">
-                <a:solidFill>
-                  <a:schemeClr val="bg1"/>
-                </a:solidFill>
-              </a:rPr>
-              <a:t>Element-wise Multiplication/Division,</a:t>
-            </a:r>
-          </a:p>
-          <a:p>
-            <a:r>
-              <a:rPr lang="en-GB" dirty="0">
-                <a:solidFill>
-                  <a:schemeClr val="bg1"/>
-                </a:solidFill>
-              </a:rPr>
-              <a:t>Transposition,</a:t>
-            </a:r>
-          </a:p>
-          <a:p>
-            <a:r>
-              <a:rPr lang="en-GB" dirty="0">
-                <a:solidFill>
-                  <a:schemeClr val="bg1"/>
-                </a:solidFill>
-              </a:rPr>
-              <a:t>Matrix multiplication and dot product,</a:t>
-            </a:r>
-          </a:p>
-          <a:p>
-            <a:r>
-              <a:rPr lang="en-GB" dirty="0">
-                <a:solidFill>
-                  <a:schemeClr val="bg1"/>
-                </a:solidFill>
-              </a:rPr>
-              <a:t>Etc.</a:t>
-            </a:r>
-          </a:p>
-          <a:p>
-            <a:endParaRPr lang="en-SG" dirty="0"/>
-          </a:p>
-        </p:txBody>
-      </p:sp>
       <p:pic>
         <p:nvPicPr>
           <p:cNvPr id="9" name="Picture 8">
@@ -11974,6 +12144,53 @@
           </a:prstGeom>
         </p:spPr>
       </p:pic>
+      <p:sp>
+        <p:nvSpPr>
+          <p:cNvPr id="6" name="Content Placeholder 3">
+            <a:extLst>
+              <a:ext uri="{FF2B5EF4-FFF2-40B4-BE49-F238E27FC236}">
+                <a16:creationId xmlns:a16="http://schemas.microsoft.com/office/drawing/2014/main" id="{D7DD82EB-95E2-C9DB-F4EA-EEAA4EF9034D}"/>
+              </a:ext>
+            </a:extLst>
+          </p:cNvPr>
+          <p:cNvSpPr>
+            <a:spLocks noGrp="1"/>
+          </p:cNvSpPr>
+          <p:nvPr>
+            <p:ph sz="half" idx="1"/>
+          </p:nvPr>
+        </p:nvSpPr>
+        <p:spPr>
+          <a:xfrm>
+            <a:off x="838199" y="1825624"/>
+            <a:ext cx="5592097" cy="5032375"/>
+          </a:xfrm>
+        </p:spPr>
+        <p:txBody>
+          <a:bodyPr>
+            <a:normAutofit/>
+          </a:bodyPr>
+          <a:lstStyle/>
+          <a:p>
+            <a:pPr marL="0" indent="0">
+              <a:buNone/>
+            </a:pPr>
+            <a:r>
+              <a:rPr lang="en-GB" dirty="0"/>
+              <a:t>All NumPy array operations work on Tensors and equivalent methods have been written in torch as well.</a:t>
+            </a:r>
+          </a:p>
+          <a:p>
+            <a:r>
+              <a:rPr lang="en-GB" dirty="0"/>
+              <a:t>Element-wise Addition/Subtraction,</a:t>
+            </a:r>
+          </a:p>
+          <a:p>
+            <a:endParaRPr lang="en-SG" dirty="0"/>
+          </a:p>
+        </p:txBody>
+      </p:sp>
     </p:spTree>
     <p:extLst>
       <p:ext uri="{BB962C8B-B14F-4D97-AF65-F5344CB8AC3E}">
@@ -12040,89 +12257,6 @@
           </a:p>
         </p:txBody>
       </p:sp>
-      <p:sp>
-        <p:nvSpPr>
-          <p:cNvPr id="4" name="Content Placeholder 3">
-            <a:extLst>
-              <a:ext uri="{FF2B5EF4-FFF2-40B4-BE49-F238E27FC236}">
-                <a16:creationId xmlns:a16="http://schemas.microsoft.com/office/drawing/2014/main" id="{11F8287B-68F9-6307-9899-F1C2672A4FC6}"/>
-              </a:ext>
-            </a:extLst>
-          </p:cNvPr>
-          <p:cNvSpPr>
-            <a:spLocks noGrp="1"/>
-          </p:cNvSpPr>
-          <p:nvPr>
-            <p:ph sz="half" idx="1"/>
-          </p:nvPr>
-        </p:nvSpPr>
-        <p:spPr>
-          <a:xfrm>
-            <a:off x="838200" y="1825624"/>
-            <a:ext cx="5181600" cy="5032375"/>
-          </a:xfrm>
-        </p:spPr>
-        <p:txBody>
-          <a:bodyPr>
-            <a:normAutofit lnSpcReduction="10000"/>
-          </a:bodyPr>
-          <a:lstStyle/>
-          <a:p>
-            <a:pPr marL="0" indent="0">
-              <a:buNone/>
-            </a:pPr>
-            <a:r>
-              <a:rPr lang="en-GB" dirty="0"/>
-              <a:t>All NumPy array operations work on Tensors and equivalent methods have been written in torch as well.</a:t>
-            </a:r>
-          </a:p>
-          <a:p>
-            <a:r>
-              <a:rPr lang="en-GB" dirty="0"/>
-              <a:t>Element-wise Addition/Subtraction,</a:t>
-            </a:r>
-          </a:p>
-          <a:p>
-            <a:r>
-              <a:rPr lang="en-GB" dirty="0"/>
-              <a:t>Element-wise Multiplication/Division,</a:t>
-            </a:r>
-          </a:p>
-          <a:p>
-            <a:r>
-              <a:rPr lang="en-GB" dirty="0">
-                <a:solidFill>
-                  <a:schemeClr val="bg1"/>
-                </a:solidFill>
-              </a:rPr>
-              <a:t>Transposition,</a:t>
-            </a:r>
-          </a:p>
-          <a:p>
-            <a:r>
-              <a:rPr lang="en-GB" dirty="0">
-                <a:solidFill>
-                  <a:schemeClr val="bg1"/>
-                </a:solidFill>
-              </a:rPr>
-              <a:t>Matrix multiplication and dot product,</a:t>
-            </a:r>
-          </a:p>
-          <a:p>
-            <a:r>
-              <a:rPr lang="en-GB" dirty="0">
-                <a:solidFill>
-                  <a:schemeClr val="bg1"/>
-                </a:solidFill>
-              </a:rPr>
-              <a:t>Etc.</a:t>
-            </a:r>
-          </a:p>
-          <a:p>
-            <a:endParaRPr lang="en-SG" dirty="0"/>
-          </a:p>
-        </p:txBody>
-      </p:sp>
       <p:pic>
         <p:nvPicPr>
           <p:cNvPr id="11" name="Picture 10">
@@ -12183,6 +12317,56 @@
           </a:prstGeom>
         </p:spPr>
       </p:pic>
+      <p:sp>
+        <p:nvSpPr>
+          <p:cNvPr id="8" name="Content Placeholder 3">
+            <a:extLst>
+              <a:ext uri="{FF2B5EF4-FFF2-40B4-BE49-F238E27FC236}">
+                <a16:creationId xmlns:a16="http://schemas.microsoft.com/office/drawing/2014/main" id="{95E6B02B-00D1-4B97-B7BC-916C0CB69899}"/>
+              </a:ext>
+            </a:extLst>
+          </p:cNvPr>
+          <p:cNvSpPr>
+            <a:spLocks noGrp="1"/>
+          </p:cNvSpPr>
+          <p:nvPr>
+            <p:ph sz="half" idx="1"/>
+          </p:nvPr>
+        </p:nvSpPr>
+        <p:spPr>
+          <a:xfrm>
+            <a:off x="838199" y="1825624"/>
+            <a:ext cx="5592097" cy="5032375"/>
+          </a:xfrm>
+        </p:spPr>
+        <p:txBody>
+          <a:bodyPr>
+            <a:normAutofit/>
+          </a:bodyPr>
+          <a:lstStyle/>
+          <a:p>
+            <a:pPr marL="0" indent="0">
+              <a:buNone/>
+            </a:pPr>
+            <a:r>
+              <a:rPr lang="en-GB" dirty="0"/>
+              <a:t>All NumPy array operations work on Tensors and equivalent methods have been written in torch as well.</a:t>
+            </a:r>
+          </a:p>
+          <a:p>
+            <a:r>
+              <a:rPr lang="en-GB" dirty="0"/>
+              <a:t>Element-wise Addition/Subtraction,</a:t>
+            </a:r>
+          </a:p>
+          <a:p>
+            <a:r>
+              <a:rPr lang="en-GB" dirty="0"/>
+              <a:t>Element-wise Multiplication/Division,</a:t>
+            </a:r>
+          </a:p>
+        </p:txBody>
+      </p:sp>
     </p:spTree>
     <p:extLst>
       <p:ext uri="{BB962C8B-B14F-4D97-AF65-F5344CB8AC3E}">
@@ -12249,85 +12433,6 @@
           </a:p>
         </p:txBody>
       </p:sp>
-      <p:sp>
-        <p:nvSpPr>
-          <p:cNvPr id="4" name="Content Placeholder 3">
-            <a:extLst>
-              <a:ext uri="{FF2B5EF4-FFF2-40B4-BE49-F238E27FC236}">
-                <a16:creationId xmlns:a16="http://schemas.microsoft.com/office/drawing/2014/main" id="{11F8287B-68F9-6307-9899-F1C2672A4FC6}"/>
-              </a:ext>
-            </a:extLst>
-          </p:cNvPr>
-          <p:cNvSpPr>
-            <a:spLocks noGrp="1"/>
-          </p:cNvSpPr>
-          <p:nvPr>
-            <p:ph sz="half" idx="1"/>
-          </p:nvPr>
-        </p:nvSpPr>
-        <p:spPr>
-          <a:xfrm>
-            <a:off x="838200" y="1825624"/>
-            <a:ext cx="5181600" cy="5032375"/>
-          </a:xfrm>
-        </p:spPr>
-        <p:txBody>
-          <a:bodyPr>
-            <a:normAutofit lnSpcReduction="10000"/>
-          </a:bodyPr>
-          <a:lstStyle/>
-          <a:p>
-            <a:pPr marL="0" indent="0">
-              <a:buNone/>
-            </a:pPr>
-            <a:r>
-              <a:rPr lang="en-GB" dirty="0"/>
-              <a:t>All NumPy array operations work on Tensors and equivalent methods have been written in torch as well.</a:t>
-            </a:r>
-          </a:p>
-          <a:p>
-            <a:r>
-              <a:rPr lang="en-GB" dirty="0"/>
-              <a:t>Element-wise Addition/Subtraction,</a:t>
-            </a:r>
-          </a:p>
-          <a:p>
-            <a:r>
-              <a:rPr lang="en-GB" dirty="0"/>
-              <a:t>Element-wise Multiplication/Division,</a:t>
-            </a:r>
-          </a:p>
-          <a:p>
-            <a:r>
-              <a:rPr lang="en-GB" dirty="0"/>
-              <a:t>Transposition,</a:t>
-            </a:r>
-          </a:p>
-          <a:p>
-            <a:r>
-              <a:rPr lang="en-GB" dirty="0">
-                <a:solidFill>
-                  <a:schemeClr val="bg1"/>
-                </a:solidFill>
-              </a:rPr>
-              <a:t>Matrix multiplication and dot product,</a:t>
-            </a:r>
-          </a:p>
-          <a:p>
-            <a:r>
-              <a:rPr lang="en-GB" dirty="0">
-                <a:solidFill>
-                  <a:schemeClr val="bg1"/>
-                </a:solidFill>
-              </a:rPr>
-              <a:t>Etc.</a:t>
-            </a:r>
-          </a:p>
-          <a:p>
-            <a:endParaRPr lang="en-SG" dirty="0"/>
-          </a:p>
-        </p:txBody>
-      </p:sp>
       <p:pic>
         <p:nvPicPr>
           <p:cNvPr id="11" name="Picture 10">
@@ -12388,6 +12493,65 @@
           </a:prstGeom>
         </p:spPr>
       </p:pic>
+      <p:sp>
+        <p:nvSpPr>
+          <p:cNvPr id="7" name="Content Placeholder 3">
+            <a:extLst>
+              <a:ext uri="{FF2B5EF4-FFF2-40B4-BE49-F238E27FC236}">
+                <a16:creationId xmlns:a16="http://schemas.microsoft.com/office/drawing/2014/main" id="{0BFBA435-DBD0-76FC-67E1-9A809C6F4DB4}"/>
+              </a:ext>
+            </a:extLst>
+          </p:cNvPr>
+          <p:cNvSpPr>
+            <a:spLocks noGrp="1"/>
+          </p:cNvSpPr>
+          <p:nvPr>
+            <p:ph sz="half" idx="1"/>
+          </p:nvPr>
+        </p:nvSpPr>
+        <p:spPr>
+          <a:xfrm>
+            <a:off x="838199" y="1825624"/>
+            <a:ext cx="5592097" cy="5032375"/>
+          </a:xfrm>
+        </p:spPr>
+        <p:txBody>
+          <a:bodyPr>
+            <a:normAutofit/>
+          </a:bodyPr>
+          <a:lstStyle/>
+          <a:p>
+            <a:pPr marL="0" indent="0">
+              <a:buNone/>
+            </a:pPr>
+            <a:r>
+              <a:rPr lang="en-GB" dirty="0"/>
+              <a:t>All NumPy array operations work on Tensors and equivalent methods have been written in torch as well.</a:t>
+            </a:r>
+          </a:p>
+          <a:p>
+            <a:r>
+              <a:rPr lang="en-GB" dirty="0"/>
+              <a:t>Element-wise Addition/Subtraction,</a:t>
+            </a:r>
+          </a:p>
+          <a:p>
+            <a:r>
+              <a:rPr lang="en-GB" dirty="0"/>
+              <a:t>Element-wise Multiplication/Division,</a:t>
+            </a:r>
+          </a:p>
+          <a:p>
+            <a:r>
+              <a:rPr lang="en-GB" dirty="0"/>
+              <a:t>Transposition,</a:t>
+            </a:r>
+          </a:p>
+          <a:p>
+            <a:endParaRPr lang="en-SG" dirty="0"/>
+          </a:p>
+        </p:txBody>
+      </p:sp>
     </p:spTree>
     <p:extLst>
       <p:ext uri="{BB962C8B-B14F-4D97-AF65-F5344CB8AC3E}">
@@ -12472,13 +12636,13 @@
         </p:nvSpPr>
         <p:spPr>
           <a:xfrm>
-            <a:off x="838200" y="1825624"/>
-            <a:ext cx="5181600" cy="5032375"/>
+            <a:off x="838199" y="1825624"/>
+            <a:ext cx="5592097" cy="5032375"/>
           </a:xfrm>
         </p:spPr>
         <p:txBody>
           <a:bodyPr>
-            <a:normAutofit lnSpcReduction="10000"/>
+            <a:normAutofit/>
           </a:bodyPr>
           <a:lstStyle/>
           <a:p>
@@ -12517,7 +12681,23 @@
           <a:p>
             <a:r>
               <a:rPr lang="en-GB" dirty="0"/>
-              <a:t>Etc.</a:t>
+              <a:t>Along </a:t>
+            </a:r>
+            <a:r>
+              <a:rPr lang="en-GB"/>
+              <a:t>with more </a:t>
+            </a:r>
+            <a:r>
+              <a:rPr lang="en-GB" dirty="0"/>
+              <a:t>L</a:t>
+            </a:r>
+            <a:r>
+              <a:rPr lang="en-GB"/>
+              <a:t>inear </a:t>
+            </a:r>
+            <a:r>
+              <a:rPr lang="en-GB" dirty="0"/>
+              <a:t>Algebra stuff (now is the time to revise!).</a:t>
             </a:r>
           </a:p>
           <a:p>
@@ -18088,7 +18268,7 @@
             </a:r>
             <a:r>
               <a:rPr lang="en-GB" dirty="0"/>
-              <a:t> basic building block and is similar to NumPy arrays.</a:t>
+              <a:t> basic building block and is very similar to NumPy arrays.</a:t>
             </a:r>
           </a:p>
           <a:p>

</xml_diff>

<commit_message>
Some more changes to W3, 4, and 5. Adding Linear to W3S2.
</commit_message>
<xml_diff>
--- a/W3/1. W3S1 final/W3S1.pptx
+++ b/W3/1. W3S1 final/W3S1.pptx
@@ -4704,7 +4704,7 @@
   <pc:docChgLst>
     <pc:chgData name="Matthieu De Mari" userId="dfb708c9-d8dc-439f-9a3b-c772bf4a311c" providerId="ADAL" clId="{247D1BAE-CADF-480A-BB5E-27902C69550B}"/>
     <pc:docChg chg="undo custSel modSld">
-      <pc:chgData name="Matthieu De Mari" userId="dfb708c9-d8dc-439f-9a3b-c772bf4a311c" providerId="ADAL" clId="{247D1BAE-CADF-480A-BB5E-27902C69550B}" dt="2024-01-21T10:04:42.295" v="194" actId="20577"/>
+      <pc:chgData name="Matthieu De Mari" userId="dfb708c9-d8dc-439f-9a3b-c772bf4a311c" providerId="ADAL" clId="{247D1BAE-CADF-480A-BB5E-27902C69550B}" dt="2024-02-05T00:16:00.404" v="274" actId="20577"/>
       <pc:docMkLst>
         <pc:docMk/>
       </pc:docMkLst>
@@ -4755,6 +4755,51 @@
         </pc:spChg>
       </pc:sldChg>
       <pc:sldChg chg="modSp mod">
+        <pc:chgData name="Matthieu De Mari" userId="dfb708c9-d8dc-439f-9a3b-c772bf4a311c" providerId="ADAL" clId="{247D1BAE-CADF-480A-BB5E-27902C69550B}" dt="2024-02-02T09:05:10.759" v="225" actId="20577"/>
+        <pc:sldMkLst>
+          <pc:docMk/>
+          <pc:sldMk cId="1420298135" sldId="384"/>
+        </pc:sldMkLst>
+        <pc:spChg chg="mod">
+          <ac:chgData name="Matthieu De Mari" userId="dfb708c9-d8dc-439f-9a3b-c772bf4a311c" providerId="ADAL" clId="{247D1BAE-CADF-480A-BB5E-27902C69550B}" dt="2024-02-02T09:05:10.759" v="225" actId="20577"/>
+          <ac:spMkLst>
+            <pc:docMk/>
+            <pc:sldMk cId="1420298135" sldId="384"/>
+            <ac:spMk id="5" creationId="{CBDF5152-8165-F342-BDF9-7CF1D911D8E8}"/>
+          </ac:spMkLst>
+        </pc:spChg>
+      </pc:sldChg>
+      <pc:sldChg chg="modSp mod">
+        <pc:chgData name="Matthieu De Mari" userId="dfb708c9-d8dc-439f-9a3b-c772bf4a311c" providerId="ADAL" clId="{247D1BAE-CADF-480A-BB5E-27902C69550B}" dt="2024-02-02T09:06:20.966" v="230" actId="5793"/>
+        <pc:sldMkLst>
+          <pc:docMk/>
+          <pc:sldMk cId="1116470923" sldId="386"/>
+        </pc:sldMkLst>
+        <pc:spChg chg="mod">
+          <ac:chgData name="Matthieu De Mari" userId="dfb708c9-d8dc-439f-9a3b-c772bf4a311c" providerId="ADAL" clId="{247D1BAE-CADF-480A-BB5E-27902C69550B}" dt="2024-02-02T09:06:20.966" v="230" actId="5793"/>
+          <ac:spMkLst>
+            <pc:docMk/>
+            <pc:sldMk cId="1116470923" sldId="386"/>
+            <ac:spMk id="3" creationId="{44608F03-1D5E-5E62-5A70-1B8EB17DF397}"/>
+          </ac:spMkLst>
+        </pc:spChg>
+      </pc:sldChg>
+      <pc:sldChg chg="modSp mod">
+        <pc:chgData name="Matthieu De Mari" userId="dfb708c9-d8dc-439f-9a3b-c772bf4a311c" providerId="ADAL" clId="{247D1BAE-CADF-480A-BB5E-27902C69550B}" dt="2024-02-05T00:12:40.043" v="234" actId="20577"/>
+        <pc:sldMkLst>
+          <pc:docMk/>
+          <pc:sldMk cId="3358927626" sldId="406"/>
+        </pc:sldMkLst>
+        <pc:spChg chg="mod">
+          <ac:chgData name="Matthieu De Mari" userId="dfb708c9-d8dc-439f-9a3b-c772bf4a311c" providerId="ADAL" clId="{247D1BAE-CADF-480A-BB5E-27902C69550B}" dt="2024-02-05T00:12:40.043" v="234" actId="20577"/>
+          <ac:spMkLst>
+            <pc:docMk/>
+            <pc:sldMk cId="3358927626" sldId="406"/>
+            <ac:spMk id="3" creationId="{40B01D2C-4BE4-C6CD-31D7-3F2E182779DF}"/>
+          </ac:spMkLst>
+        </pc:spChg>
+      </pc:sldChg>
+      <pc:sldChg chg="modSp mod">
         <pc:chgData name="Matthieu De Mari" userId="dfb708c9-d8dc-439f-9a3b-c772bf4a311c" providerId="ADAL" clId="{247D1BAE-CADF-480A-BB5E-27902C69550B}" dt="2024-01-21T10:01:54.988" v="85" actId="5793"/>
         <pc:sldMkLst>
           <pc:docMk/>
@@ -4919,6 +4964,21 @@
             <pc:docMk/>
             <pc:sldMk cId="1773283043" sldId="420"/>
             <ac:spMk id="4" creationId="{11F8287B-68F9-6307-9899-F1C2672A4FC6}"/>
+          </ac:spMkLst>
+        </pc:spChg>
+      </pc:sldChg>
+      <pc:sldChg chg="modSp mod">
+        <pc:chgData name="Matthieu De Mari" userId="dfb708c9-d8dc-439f-9a3b-c772bf4a311c" providerId="ADAL" clId="{247D1BAE-CADF-480A-BB5E-27902C69550B}" dt="2024-02-05T00:16:00.404" v="274" actId="20577"/>
+        <pc:sldMkLst>
+          <pc:docMk/>
+          <pc:sldMk cId="1146881653" sldId="649"/>
+        </pc:sldMkLst>
+        <pc:spChg chg="mod">
+          <ac:chgData name="Matthieu De Mari" userId="dfb708c9-d8dc-439f-9a3b-c772bf4a311c" providerId="ADAL" clId="{247D1BAE-CADF-480A-BB5E-27902C69550B}" dt="2024-02-05T00:16:00.404" v="274" actId="20577"/>
+          <ac:spMkLst>
+            <pc:docMk/>
+            <pc:sldMk cId="1146881653" sldId="649"/>
+            <ac:spMk id="3" creationId="{DC9D8363-826B-D189-78FB-CCD945BC5477}"/>
           </ac:spMkLst>
         </pc:spChg>
       </pc:sldChg>
@@ -5009,7 +5069,7 @@
           <a:p>
             <a:fld id="{61478373-EB31-4867-8CF0-FA31364748A5}" type="datetimeFigureOut">
               <a:rPr lang="en-GB" smtClean="0"/>
-              <a:t>21/01/2024</a:t>
+              <a:t>05/02/2024</a:t>
             </a:fld>
             <a:endParaRPr lang="en-GB"/>
           </a:p>
@@ -5426,7 +5486,7 @@
           <a:p>
             <a:fld id="{E85DF616-B21E-4EF6-A6A5-95E2FB3EB1A1}" type="datetimeFigureOut">
               <a:rPr lang="en-GB" smtClean="0"/>
-              <a:t>21/01/2024</a:t>
+              <a:t>05/02/2024</a:t>
             </a:fld>
             <a:endParaRPr lang="en-GB"/>
           </a:p>
@@ -5626,7 +5686,7 @@
           <a:p>
             <a:fld id="{E85DF616-B21E-4EF6-A6A5-95E2FB3EB1A1}" type="datetimeFigureOut">
               <a:rPr lang="en-GB" smtClean="0"/>
-              <a:t>21/01/2024</a:t>
+              <a:t>05/02/2024</a:t>
             </a:fld>
             <a:endParaRPr lang="en-GB"/>
           </a:p>
@@ -5836,7 +5896,7 @@
           <a:p>
             <a:fld id="{E85DF616-B21E-4EF6-A6A5-95E2FB3EB1A1}" type="datetimeFigureOut">
               <a:rPr lang="en-GB" smtClean="0"/>
-              <a:t>21/01/2024</a:t>
+              <a:t>05/02/2024</a:t>
             </a:fld>
             <a:endParaRPr lang="en-GB"/>
           </a:p>
@@ -6036,7 +6096,7 @@
           <a:p>
             <a:fld id="{E85DF616-B21E-4EF6-A6A5-95E2FB3EB1A1}" type="datetimeFigureOut">
               <a:rPr lang="en-GB" smtClean="0"/>
-              <a:t>21/01/2024</a:t>
+              <a:t>05/02/2024</a:t>
             </a:fld>
             <a:endParaRPr lang="en-GB"/>
           </a:p>
@@ -6312,7 +6372,7 @@
           <a:p>
             <a:fld id="{E85DF616-B21E-4EF6-A6A5-95E2FB3EB1A1}" type="datetimeFigureOut">
               <a:rPr lang="en-GB" smtClean="0"/>
-              <a:t>21/01/2024</a:t>
+              <a:t>05/02/2024</a:t>
             </a:fld>
             <a:endParaRPr lang="en-GB"/>
           </a:p>
@@ -6580,7 +6640,7 @@
           <a:p>
             <a:fld id="{E85DF616-B21E-4EF6-A6A5-95E2FB3EB1A1}" type="datetimeFigureOut">
               <a:rPr lang="en-GB" smtClean="0"/>
-              <a:t>21/01/2024</a:t>
+              <a:t>05/02/2024</a:t>
             </a:fld>
             <a:endParaRPr lang="en-GB"/>
           </a:p>
@@ -6995,7 +7055,7 @@
           <a:p>
             <a:fld id="{E85DF616-B21E-4EF6-A6A5-95E2FB3EB1A1}" type="datetimeFigureOut">
               <a:rPr lang="en-GB" smtClean="0"/>
-              <a:t>21/01/2024</a:t>
+              <a:t>05/02/2024</a:t>
             </a:fld>
             <a:endParaRPr lang="en-GB"/>
           </a:p>
@@ -7137,7 +7197,7 @@
           <a:p>
             <a:fld id="{E85DF616-B21E-4EF6-A6A5-95E2FB3EB1A1}" type="datetimeFigureOut">
               <a:rPr lang="en-GB" smtClean="0"/>
-              <a:t>21/01/2024</a:t>
+              <a:t>05/02/2024</a:t>
             </a:fld>
             <a:endParaRPr lang="en-GB"/>
           </a:p>
@@ -7250,7 +7310,7 @@
           <a:p>
             <a:fld id="{E85DF616-B21E-4EF6-A6A5-95E2FB3EB1A1}" type="datetimeFigureOut">
               <a:rPr lang="en-GB" smtClean="0"/>
-              <a:t>21/01/2024</a:t>
+              <a:t>05/02/2024</a:t>
             </a:fld>
             <a:endParaRPr lang="en-GB"/>
           </a:p>
@@ -7563,7 +7623,7 @@
           <a:p>
             <a:fld id="{E85DF616-B21E-4EF6-A6A5-95E2FB3EB1A1}" type="datetimeFigureOut">
               <a:rPr lang="en-GB" smtClean="0"/>
-              <a:t>21/01/2024</a:t>
+              <a:t>05/02/2024</a:t>
             </a:fld>
             <a:endParaRPr lang="en-GB"/>
           </a:p>
@@ -7852,7 +7912,7 @@
           <a:p>
             <a:fld id="{E85DF616-B21E-4EF6-A6A5-95E2FB3EB1A1}" type="datetimeFigureOut">
               <a:rPr lang="en-GB" smtClean="0"/>
-              <a:t>21/01/2024</a:t>
+              <a:t>05/02/2024</a:t>
             </a:fld>
             <a:endParaRPr lang="en-GB"/>
           </a:p>
@@ -8095,7 +8155,7 @@
           <a:p>
             <a:fld id="{E85DF616-B21E-4EF6-A6A5-95E2FB3EB1A1}" type="datetimeFigureOut">
               <a:rPr lang="en-GB" smtClean="0"/>
-              <a:t>21/01/2024</a:t>
+              <a:t>05/02/2024</a:t>
             </a:fld>
             <a:endParaRPr lang="en-GB"/>
           </a:p>
@@ -15635,7 +15695,7 @@
             </a:r>
             <a:r>
               <a:rPr lang="en-GB" b="1" dirty="0" err="1"/>
-              <a:t>retain_grad</a:t>
+              <a:t>requires_grad</a:t>
             </a:r>
             <a:r>
               <a:rPr lang="en-GB" b="1" dirty="0"/>
@@ -15656,6 +15716,14 @@
             <a:r>
               <a:rPr lang="en-GB" b="1" dirty="0"/>
               <a:t>during</a:t>
+            </a:r>
+            <a:r>
+              <a:rPr lang="en-GB" dirty="0"/>
+              <a:t> </a:t>
+            </a:r>
+            <a:r>
+              <a:rPr lang="en-GB" b="1" dirty="0"/>
+              <a:t>forward operations and</a:t>
             </a:r>
             <a:r>
               <a:rPr lang="en-GB" dirty="0"/>
@@ -15704,7 +15772,7 @@
             </a:r>
             <a:r>
               <a:rPr lang="en-GB" dirty="0"/>
-              <a:t> to keep track of operations happening during the forward pass, later allowing to compute the gradients of intermediate tensors.</a:t>
+              <a:t> to keep track of operations happening during the forward pass, later allowing to compute the gradients of these intermediate tensors.</a:t>
             </a:r>
           </a:p>
           <a:p>
@@ -15835,7 +15903,7 @@
             </a:pPr>
             <a:r>
               <a:rPr lang="en-GB" dirty="0"/>
-              <a:t>The forward pass can be rewritten. You can replace the NumPy operations with their </a:t>
+              <a:t>The forward pass can be rewritten. You can replace most NumPy operations with their </a:t>
             </a:r>
             <a:r>
               <a:rPr lang="en-GB" dirty="0" err="1"/>
@@ -16723,6 +16791,9 @@
           </a:bodyPr>
           <a:lstStyle/>
           <a:p>
+            <a:pPr marL="0" indent="0">
+              <a:buNone/>
+            </a:pPr>
             <a:r>
               <a:rPr lang="en-GB" dirty="0"/>
               <a:t>Let us run both models (the NumPy one and the </a:t>
@@ -16739,7 +16810,7 @@
           <a:p>
             <a:r>
               <a:rPr lang="en-GB" dirty="0"/>
-              <a:t>On my machine (CUDA, Nvidia GTX 1060), the </a:t>
+              <a:t>On my machine (CUDA, Nvidia GTX 4070), the </a:t>
             </a:r>
             <a:r>
               <a:rPr lang="en-GB" dirty="0" err="1"/>
@@ -18090,13 +18161,19 @@
           <a:p>
             <a:r>
               <a:rPr lang="en-GB" dirty="0"/>
-              <a:t>You can check for CUDA/GPU capabilities, using the line below. If the CUDA has not been properly installed or the GPU is not compatible, you will be using a CPU instead.</a:t>
-            </a:r>
-          </a:p>
-          <a:p>
-            <a:r>
-              <a:rPr lang="en-GB" dirty="0"/>
-              <a:t>We strongly advise to take a moment to make sure your machine is CUDA enabled, assuming your GPU is compatible. When CUDA is properly installed on a compatible GPU, the line below should display </a:t>
+              <a:t>You can check for CUDA/GPU capabilities, using the code below. If the CUDA has not been properly installed or the GPU is not compatible, you will be using a CPU instead.</a:t>
+            </a:r>
+          </a:p>
+          <a:p>
+            <a:r>
+              <a:rPr lang="en-GB" dirty="0"/>
+              <a:t>We strongly advise to take a moment to make sure your machine is CUDA enabled, assuming your GPU is compatible (see W1S1 bonus).</a:t>
+            </a:r>
+          </a:p>
+          <a:p>
+            <a:r>
+              <a:rPr lang="en-GB" dirty="0"/>
+              <a:t>When CUDA is properly installed on a compatible GPU, the line below should display </a:t>
             </a:r>
             <a:r>
               <a:rPr lang="en-GB" i="1" dirty="0" err="1"/>

</xml_diff>